<commit_message>
Re-submission of CapstoneThree - Presentation
</commit_message>
<xml_diff>
--- a/Assignments/CapstoneThree/CapstoneThree_Presentation.pptx
+++ b/Assignments/CapstoneThree/CapstoneThree_Presentation.pptx
@@ -14,10 +14,11 @@
     <p:sldId id="263" r:id="rId8"/>
     <p:sldId id="268" r:id="rId9"/>
     <p:sldId id="269" r:id="rId10"/>
-    <p:sldId id="273" r:id="rId11"/>
-    <p:sldId id="267" r:id="rId12"/>
-    <p:sldId id="271" r:id="rId13"/>
-    <p:sldId id="270" r:id="rId14"/>
+    <p:sldId id="275" r:id="rId11"/>
+    <p:sldId id="274" r:id="rId12"/>
+    <p:sldId id="267" r:id="rId13"/>
+    <p:sldId id="271" r:id="rId14"/>
+    <p:sldId id="270" r:id="rId15"/>
   </p:sldIdLst>
   <p:sldSz cx="12192000" cy="6858000"/>
   <p:notesSz cx="6858000" cy="9144000"/>
@@ -341,7 +342,7 @@
           <a:p>
             <a:fld id="{0E9B0257-B9FB-4EF6-8F61-AF32D2A65871}" type="datetimeFigureOut">
               <a:rPr lang="en-US" smtClean="0"/>
-              <a:t>8/7/2021</a:t>
+              <a:t>8/10/2021</a:t>
             </a:fld>
             <a:endParaRPr lang="en-US"/>
           </a:p>
@@ -676,7 +677,7 @@
           <a:p>
             <a:fld id="{0E9B0257-B9FB-4EF6-8F61-AF32D2A65871}" type="datetimeFigureOut">
               <a:rPr lang="en-US" smtClean="0"/>
-              <a:t>8/7/2021</a:t>
+              <a:t>8/10/2021</a:t>
             </a:fld>
             <a:endParaRPr lang="en-US"/>
           </a:p>
@@ -979,7 +980,7 @@
           <a:p>
             <a:fld id="{0E9B0257-B9FB-4EF6-8F61-AF32D2A65871}" type="datetimeFigureOut">
               <a:rPr lang="en-US" smtClean="0"/>
-              <a:t>8/7/2021</a:t>
+              <a:t>8/10/2021</a:t>
             </a:fld>
             <a:endParaRPr lang="en-US"/>
           </a:p>
@@ -1227,7 +1228,7 @@
           <a:p>
             <a:fld id="{0E9B0257-B9FB-4EF6-8F61-AF32D2A65871}" type="datetimeFigureOut">
               <a:rPr lang="en-US" smtClean="0"/>
-              <a:t>8/7/2021</a:t>
+              <a:t>8/10/2021</a:t>
             </a:fld>
             <a:endParaRPr lang="en-US"/>
           </a:p>
@@ -1635,7 +1636,7 @@
           <a:p>
             <a:fld id="{0E9B0257-B9FB-4EF6-8F61-AF32D2A65871}" type="datetimeFigureOut">
               <a:rPr lang="en-US" smtClean="0"/>
-              <a:t>8/7/2021</a:t>
+              <a:t>8/10/2021</a:t>
             </a:fld>
             <a:endParaRPr lang="en-US"/>
           </a:p>
@@ -1950,7 +1951,7 @@
           <a:p>
             <a:fld id="{0E9B0257-B9FB-4EF6-8F61-AF32D2A65871}" type="datetimeFigureOut">
               <a:rPr lang="en-US" smtClean="0"/>
-              <a:t>8/7/2021</a:t>
+              <a:t>8/10/2021</a:t>
             </a:fld>
             <a:endParaRPr lang="en-US"/>
           </a:p>
@@ -2495,7 +2496,7 @@
           <a:p>
             <a:fld id="{0E9B0257-B9FB-4EF6-8F61-AF32D2A65871}" type="datetimeFigureOut">
               <a:rPr lang="en-US" smtClean="0"/>
-              <a:t>8/7/2021</a:t>
+              <a:t>8/10/2021</a:t>
             </a:fld>
             <a:endParaRPr lang="en-US"/>
           </a:p>
@@ -2691,7 +2692,7 @@
           <a:p>
             <a:fld id="{0E9B0257-B9FB-4EF6-8F61-AF32D2A65871}" type="datetimeFigureOut">
               <a:rPr lang="en-US" smtClean="0"/>
-              <a:t>8/7/2021</a:t>
+              <a:t>8/10/2021</a:t>
             </a:fld>
             <a:endParaRPr lang="en-US"/>
           </a:p>
@@ -2905,7 +2906,7 @@
           <a:p>
             <a:fld id="{0E9B0257-B9FB-4EF6-8F61-AF32D2A65871}" type="datetimeFigureOut">
               <a:rPr lang="en-US" smtClean="0"/>
-              <a:t>8/7/2021</a:t>
+              <a:t>8/10/2021</a:t>
             </a:fld>
             <a:endParaRPr lang="en-US"/>
           </a:p>
@@ -3275,7 +3276,7 @@
           <a:p>
             <a:fld id="{0E9B0257-B9FB-4EF6-8F61-AF32D2A65871}" type="datetimeFigureOut">
               <a:rPr lang="en-US" smtClean="0"/>
-              <a:t>8/7/2021</a:t>
+              <a:t>8/10/2021</a:t>
             </a:fld>
             <a:endParaRPr lang="en-US"/>
           </a:p>
@@ -3679,7 +3680,7 @@
           <a:p>
             <a:fld id="{0E9B0257-B9FB-4EF6-8F61-AF32D2A65871}" type="datetimeFigureOut">
               <a:rPr lang="en-US" smtClean="0"/>
-              <a:t>8/7/2021</a:t>
+              <a:t>8/10/2021</a:t>
             </a:fld>
             <a:endParaRPr lang="en-US"/>
           </a:p>
@@ -3991,7 +3992,7 @@
           <a:p>
             <a:fld id="{0E9B0257-B9FB-4EF6-8F61-AF32D2A65871}" type="datetimeFigureOut">
               <a:rPr lang="en-US" smtClean="0"/>
-              <a:t>8/7/2021</a:t>
+              <a:t>8/10/2021</a:t>
             </a:fld>
             <a:endParaRPr lang="en-US"/>
           </a:p>
@@ -4749,6 +4750,55 @@
       </p:grpSpPr>
       <p:sp>
         <p:nvSpPr>
+          <p:cNvPr id="10" name="Rectangle 9">
+            <a:extLst>
+              <a:ext uri="{FF2B5EF4-FFF2-40B4-BE49-F238E27FC236}">
+                <a16:creationId xmlns:a16="http://schemas.microsoft.com/office/drawing/2014/main" id="{4BCE01EE-CBE6-468E-A228-1CFE5A870133}"/>
+              </a:ext>
+            </a:extLst>
+          </p:cNvPr>
+          <p:cNvSpPr/>
+          <p:nvPr/>
+        </p:nvSpPr>
+        <p:spPr>
+          <a:xfrm>
+            <a:off x="1398437" y="2330149"/>
+            <a:ext cx="4885631" cy="1757028"/>
+          </a:xfrm>
+          <a:prstGeom prst="rect">
+            <a:avLst/>
+          </a:prstGeom>
+          <a:solidFill>
+            <a:schemeClr val="tx1"/>
+          </a:solidFill>
+        </p:spPr>
+        <p:style>
+          <a:lnRef idx="2">
+            <a:schemeClr val="accent1">
+              <a:shade val="50000"/>
+            </a:schemeClr>
+          </a:lnRef>
+          <a:fillRef idx="1">
+            <a:schemeClr val="accent1"/>
+          </a:fillRef>
+          <a:effectRef idx="0">
+            <a:schemeClr val="accent1"/>
+          </a:effectRef>
+          <a:fontRef idx="minor">
+            <a:schemeClr val="lt1"/>
+          </a:fontRef>
+        </p:style>
+        <p:txBody>
+          <a:bodyPr rtlCol="0" anchor="ctr"/>
+          <a:lstStyle/>
+          <a:p>
+            <a:pPr algn="ctr"/>
+            <a:endParaRPr lang="en-US"/>
+          </a:p>
+        </p:txBody>
+      </p:sp>
+      <p:sp>
+        <p:nvSpPr>
           <p:cNvPr id="2" name="Title 1">
             <a:extLst>
               <a:ext uri="{FF2B5EF4-FFF2-40B4-BE49-F238E27FC236}">
@@ -4794,35 +4844,6 @@
           </a:p>
         </p:txBody>
       </p:sp>
-      <p:pic>
-        <p:nvPicPr>
-          <p:cNvPr id="6" name="Content Placeholder 5">
-            <a:extLst>
-              <a:ext uri="{FF2B5EF4-FFF2-40B4-BE49-F238E27FC236}">
-                <a16:creationId xmlns:a16="http://schemas.microsoft.com/office/drawing/2014/main" id="{10196B40-AE39-4680-AE25-CADA4433A3A7}"/>
-              </a:ext>
-            </a:extLst>
-          </p:cNvPr>
-          <p:cNvPicPr>
-            <a:picLocks noGrp="1" noChangeAspect="1"/>
-          </p:cNvPicPr>
-          <p:nvPr>
-            <p:ph idx="1"/>
-          </p:nvPr>
-        </p:nvPicPr>
-        <p:blipFill>
-          <a:blip r:embed="rId2"/>
-          <a:stretch>
-            <a:fillRect/>
-          </a:stretch>
-        </p:blipFill>
-        <p:spPr>
-          <a:xfrm>
-            <a:off x="1352784" y="2490405"/>
-            <a:ext cx="4743216" cy="1609560"/>
-          </a:xfrm>
-        </p:spPr>
-      </p:pic>
       <p:pic>
         <p:nvPicPr>
           <p:cNvPr id="4" name="Picture 3">
@@ -4838,7 +4859,7 @@
           <p:nvPr/>
         </p:nvPicPr>
         <p:blipFill>
-          <a:blip r:embed="rId3">
+          <a:blip r:embed="rId2">
             <a:extLst>
               <a:ext uri="{28A0092B-C50C-407E-A947-70E740481C1C}">
                 <a14:useLocalDpi xmlns:a14="http://schemas.microsoft.com/office/drawing/2010/main" val="0"/>
@@ -4859,12 +4880,1323 @@
           </a:prstGeom>
         </p:spPr>
       </p:pic>
+      <p:sp>
+        <p:nvSpPr>
+          <p:cNvPr id="5" name="TextBox 4">
+            <a:extLst>
+              <a:ext uri="{FF2B5EF4-FFF2-40B4-BE49-F238E27FC236}">
+                <a16:creationId xmlns:a16="http://schemas.microsoft.com/office/drawing/2014/main" id="{4E176127-3A69-4CF0-A655-9C2624E90B7B}"/>
+              </a:ext>
+            </a:extLst>
+          </p:cNvPr>
+          <p:cNvSpPr txBox="1"/>
+          <p:nvPr/>
+        </p:nvSpPr>
+        <p:spPr>
+          <a:xfrm>
+            <a:off x="1352784" y="4565774"/>
+            <a:ext cx="4743216" cy="923330"/>
+          </a:xfrm>
+          <a:prstGeom prst="rect">
+            <a:avLst/>
+          </a:prstGeom>
+          <a:noFill/>
+        </p:spPr>
+        <p:txBody>
+          <a:bodyPr wrap="square" rtlCol="0">
+            <a:spAutoFit/>
+          </a:bodyPr>
+          <a:lstStyle/>
+          <a:p>
+            <a:r>
+              <a:rPr lang="en-US" dirty="0"/>
+              <a:t>Of all four models, Gradient Boosting has the highest R2 Score and performed best.</a:t>
+            </a:r>
+          </a:p>
+          <a:p>
+            <a:endParaRPr lang="en-US" dirty="0"/>
+          </a:p>
+        </p:txBody>
+      </p:sp>
+      <p:graphicFrame>
+        <p:nvGraphicFramePr>
+          <p:cNvPr id="11" name="Table 10">
+            <a:extLst>
+              <a:ext uri="{FF2B5EF4-FFF2-40B4-BE49-F238E27FC236}">
+                <a16:creationId xmlns:a16="http://schemas.microsoft.com/office/drawing/2014/main" id="{22F00461-78DD-4800-8911-AC9AC91E8E1F}"/>
+              </a:ext>
+            </a:extLst>
+          </p:cNvPr>
+          <p:cNvGraphicFramePr>
+            <a:graphicFrameLocks noGrp="1"/>
+          </p:cNvGraphicFramePr>
+          <p:nvPr>
+            <p:extLst>
+              <p:ext uri="{D42A27DB-BD31-4B8C-83A1-F6EECF244321}">
+                <p14:modId xmlns:p14="http://schemas.microsoft.com/office/powerpoint/2010/main" val="465692064"/>
+              </p:ext>
+            </p:extLst>
+          </p:nvPr>
+        </p:nvGraphicFramePr>
+        <p:xfrm>
+          <a:off x="1398437" y="2330148"/>
+          <a:ext cx="4885631" cy="1757025"/>
+        </p:xfrm>
+        <a:graphic>
+          <a:graphicData uri="http://schemas.openxmlformats.org/drawingml/2006/table">
+            <a:tbl>
+              <a:tblPr/>
+              <a:tblGrid>
+                <a:gridCol w="1507641">
+                  <a:extLst>
+                    <a:ext uri="{9D8B030D-6E8A-4147-A177-3AD203B41FA5}">
+                      <a16:colId xmlns:a16="http://schemas.microsoft.com/office/drawing/2014/main" val="2549622666"/>
+                    </a:ext>
+                  </a:extLst>
+                </a:gridCol>
+                <a:gridCol w="1188633">
+                  <a:extLst>
+                    <a:ext uri="{9D8B030D-6E8A-4147-A177-3AD203B41FA5}">
+                      <a16:colId xmlns:a16="http://schemas.microsoft.com/office/drawing/2014/main" val="3322688111"/>
+                    </a:ext>
+                  </a:extLst>
+                </a:gridCol>
+                <a:gridCol w="1245443">
+                  <a:extLst>
+                    <a:ext uri="{9D8B030D-6E8A-4147-A177-3AD203B41FA5}">
+                      <a16:colId xmlns:a16="http://schemas.microsoft.com/office/drawing/2014/main" val="1258695584"/>
+                    </a:ext>
+                  </a:extLst>
+                </a:gridCol>
+                <a:gridCol w="943914">
+                  <a:extLst>
+                    <a:ext uri="{9D8B030D-6E8A-4147-A177-3AD203B41FA5}">
+                      <a16:colId xmlns:a16="http://schemas.microsoft.com/office/drawing/2014/main" val="2730392824"/>
+                    </a:ext>
+                  </a:extLst>
+                </a:gridCol>
+              </a:tblGrid>
+              <a:tr h="351405">
+                <a:tc>
+                  <a:txBody>
+                    <a:bodyPr/>
+                    <a:lstStyle/>
+                    <a:p>
+                      <a:pPr algn="ctr" fontAlgn="b"/>
+                      <a:r>
+                        <a:rPr lang="en-US" sz="1100" b="1" i="0" u="none" strike="noStrike">
+                          <a:solidFill>
+                            <a:srgbClr val="000000"/>
+                          </a:solidFill>
+                          <a:effectLst/>
+                          <a:latin typeface="Calibri" panose="020F0502020204030204" pitchFamily="34" charset="0"/>
+                        </a:rPr>
+                        <a:t>Model</a:t>
+                      </a:r>
+                    </a:p>
+                  </a:txBody>
+                  <a:tcPr marL="9525" marR="9525" marT="9525" marB="0" anchor="b">
+                    <a:lnL w="6350" cap="flat" cmpd="sng" algn="ctr">
+                      <a:solidFill>
+                        <a:srgbClr val="000000"/>
+                      </a:solidFill>
+                      <a:prstDash val="solid"/>
+                      <a:round/>
+                      <a:headEnd type="none" w="med" len="med"/>
+                      <a:tailEnd type="none" w="med" len="med"/>
+                    </a:lnL>
+                    <a:lnR w="6350" cap="flat" cmpd="sng" algn="ctr">
+                      <a:solidFill>
+                        <a:srgbClr val="000000"/>
+                      </a:solidFill>
+                      <a:prstDash val="solid"/>
+                      <a:round/>
+                      <a:headEnd type="none" w="med" len="med"/>
+                      <a:tailEnd type="none" w="med" len="med"/>
+                    </a:lnR>
+                    <a:lnT w="6350" cap="flat" cmpd="sng" algn="ctr">
+                      <a:solidFill>
+                        <a:srgbClr val="000000"/>
+                      </a:solidFill>
+                      <a:prstDash val="solid"/>
+                      <a:round/>
+                      <a:headEnd type="none" w="med" len="med"/>
+                      <a:tailEnd type="none" w="med" len="med"/>
+                    </a:lnT>
+                    <a:lnB w="6350" cap="flat" cmpd="sng" algn="ctr">
+                      <a:solidFill>
+                        <a:srgbClr val="000000"/>
+                      </a:solidFill>
+                      <a:prstDash val="solid"/>
+                      <a:round/>
+                      <a:headEnd type="none" w="med" len="med"/>
+                      <a:tailEnd type="none" w="med" len="med"/>
+                    </a:lnB>
+                    <a:solidFill>
+                      <a:srgbClr val="F8CBAD"/>
+                    </a:solidFill>
+                  </a:tcPr>
+                </a:tc>
+                <a:tc>
+                  <a:txBody>
+                    <a:bodyPr/>
+                    <a:lstStyle/>
+                    <a:p>
+                      <a:pPr algn="ctr" fontAlgn="b"/>
+                      <a:r>
+                        <a:rPr lang="en-US" sz="1100" b="1" i="0" u="none" strike="noStrike">
+                          <a:solidFill>
+                            <a:srgbClr val="000000"/>
+                          </a:solidFill>
+                          <a:effectLst/>
+                          <a:latin typeface="Calibri" panose="020F0502020204030204" pitchFamily="34" charset="0"/>
+                        </a:rPr>
+                        <a:t>R2 Score</a:t>
+                      </a:r>
+                    </a:p>
+                  </a:txBody>
+                  <a:tcPr marL="9525" marR="9525" marT="9525" marB="0" anchor="b">
+                    <a:lnL w="6350" cap="flat" cmpd="sng" algn="ctr">
+                      <a:solidFill>
+                        <a:srgbClr val="000000"/>
+                      </a:solidFill>
+                      <a:prstDash val="solid"/>
+                      <a:round/>
+                      <a:headEnd type="none" w="med" len="med"/>
+                      <a:tailEnd type="none" w="med" len="med"/>
+                    </a:lnL>
+                    <a:lnR w="6350" cap="flat" cmpd="sng" algn="ctr">
+                      <a:solidFill>
+                        <a:srgbClr val="000000"/>
+                      </a:solidFill>
+                      <a:prstDash val="solid"/>
+                      <a:round/>
+                      <a:headEnd type="none" w="med" len="med"/>
+                      <a:tailEnd type="none" w="med" len="med"/>
+                    </a:lnR>
+                    <a:lnT w="6350" cap="flat" cmpd="sng" algn="ctr">
+                      <a:solidFill>
+                        <a:srgbClr val="000000"/>
+                      </a:solidFill>
+                      <a:prstDash val="solid"/>
+                      <a:round/>
+                      <a:headEnd type="none" w="med" len="med"/>
+                      <a:tailEnd type="none" w="med" len="med"/>
+                    </a:lnT>
+                    <a:lnB w="6350" cap="flat" cmpd="sng" algn="ctr">
+                      <a:solidFill>
+                        <a:srgbClr val="000000"/>
+                      </a:solidFill>
+                      <a:prstDash val="solid"/>
+                      <a:round/>
+                      <a:headEnd type="none" w="med" len="med"/>
+                      <a:tailEnd type="none" w="med" len="med"/>
+                    </a:lnB>
+                    <a:solidFill>
+                      <a:srgbClr val="F8CBAD"/>
+                    </a:solidFill>
+                  </a:tcPr>
+                </a:tc>
+                <a:tc>
+                  <a:txBody>
+                    <a:bodyPr/>
+                    <a:lstStyle/>
+                    <a:p>
+                      <a:pPr algn="ctr" fontAlgn="b"/>
+                      <a:r>
+                        <a:rPr lang="en-US" sz="1100" b="1" i="0" u="none" strike="noStrike">
+                          <a:solidFill>
+                            <a:srgbClr val="000000"/>
+                          </a:solidFill>
+                          <a:effectLst/>
+                          <a:latin typeface="Calibri" panose="020F0502020204030204" pitchFamily="34" charset="0"/>
+                        </a:rPr>
+                        <a:t>MSE</a:t>
+                      </a:r>
+                    </a:p>
+                  </a:txBody>
+                  <a:tcPr marL="9525" marR="9525" marT="9525" marB="0" anchor="b">
+                    <a:lnL w="6350" cap="flat" cmpd="sng" algn="ctr">
+                      <a:solidFill>
+                        <a:srgbClr val="000000"/>
+                      </a:solidFill>
+                      <a:prstDash val="solid"/>
+                      <a:round/>
+                      <a:headEnd type="none" w="med" len="med"/>
+                      <a:tailEnd type="none" w="med" len="med"/>
+                    </a:lnL>
+                    <a:lnR w="6350" cap="flat" cmpd="sng" algn="ctr">
+                      <a:solidFill>
+                        <a:srgbClr val="000000"/>
+                      </a:solidFill>
+                      <a:prstDash val="solid"/>
+                      <a:round/>
+                      <a:headEnd type="none" w="med" len="med"/>
+                      <a:tailEnd type="none" w="med" len="med"/>
+                    </a:lnR>
+                    <a:lnT w="6350" cap="flat" cmpd="sng" algn="ctr">
+                      <a:solidFill>
+                        <a:srgbClr val="000000"/>
+                      </a:solidFill>
+                      <a:prstDash val="solid"/>
+                      <a:round/>
+                      <a:headEnd type="none" w="med" len="med"/>
+                      <a:tailEnd type="none" w="med" len="med"/>
+                    </a:lnT>
+                    <a:lnB w="6350" cap="flat" cmpd="sng" algn="ctr">
+                      <a:solidFill>
+                        <a:srgbClr val="000000"/>
+                      </a:solidFill>
+                      <a:prstDash val="solid"/>
+                      <a:round/>
+                      <a:headEnd type="none" w="med" len="med"/>
+                      <a:tailEnd type="none" w="med" len="med"/>
+                    </a:lnB>
+                    <a:solidFill>
+                      <a:srgbClr val="F8CBAD"/>
+                    </a:solidFill>
+                  </a:tcPr>
+                </a:tc>
+                <a:tc>
+                  <a:txBody>
+                    <a:bodyPr/>
+                    <a:lstStyle/>
+                    <a:p>
+                      <a:pPr algn="ctr" fontAlgn="b"/>
+                      <a:r>
+                        <a:rPr lang="en-US" sz="1100" b="1" i="0" u="none" strike="noStrike">
+                          <a:solidFill>
+                            <a:srgbClr val="000000"/>
+                          </a:solidFill>
+                          <a:effectLst/>
+                          <a:latin typeface="Calibri" panose="020F0502020204030204" pitchFamily="34" charset="0"/>
+                        </a:rPr>
+                        <a:t>MAE</a:t>
+                      </a:r>
+                    </a:p>
+                  </a:txBody>
+                  <a:tcPr marL="9525" marR="9525" marT="9525" marB="0" anchor="b">
+                    <a:lnL w="6350" cap="flat" cmpd="sng" algn="ctr">
+                      <a:solidFill>
+                        <a:srgbClr val="000000"/>
+                      </a:solidFill>
+                      <a:prstDash val="solid"/>
+                      <a:round/>
+                      <a:headEnd type="none" w="med" len="med"/>
+                      <a:tailEnd type="none" w="med" len="med"/>
+                    </a:lnL>
+                    <a:lnR w="6350" cap="flat" cmpd="sng" algn="ctr">
+                      <a:solidFill>
+                        <a:srgbClr val="000000"/>
+                      </a:solidFill>
+                      <a:prstDash val="solid"/>
+                      <a:round/>
+                      <a:headEnd type="none" w="med" len="med"/>
+                      <a:tailEnd type="none" w="med" len="med"/>
+                    </a:lnR>
+                    <a:lnT w="6350" cap="flat" cmpd="sng" algn="ctr">
+                      <a:solidFill>
+                        <a:srgbClr val="000000"/>
+                      </a:solidFill>
+                      <a:prstDash val="solid"/>
+                      <a:round/>
+                      <a:headEnd type="none" w="med" len="med"/>
+                      <a:tailEnd type="none" w="med" len="med"/>
+                    </a:lnT>
+                    <a:lnB w="6350" cap="flat" cmpd="sng" algn="ctr">
+                      <a:solidFill>
+                        <a:srgbClr val="000000"/>
+                      </a:solidFill>
+                      <a:prstDash val="solid"/>
+                      <a:round/>
+                      <a:headEnd type="none" w="med" len="med"/>
+                      <a:tailEnd type="none" w="med" len="med"/>
+                    </a:lnB>
+                    <a:solidFill>
+                      <a:srgbClr val="F8CBAD"/>
+                    </a:solidFill>
+                  </a:tcPr>
+                </a:tc>
+                <a:extLst>
+                  <a:ext uri="{0D108BD9-81ED-4DB2-BD59-A6C34878D82A}">
+                    <a16:rowId xmlns:a16="http://schemas.microsoft.com/office/drawing/2014/main" val="18991178"/>
+                  </a:ext>
+                </a:extLst>
+              </a:tr>
+              <a:tr h="351405">
+                <a:tc>
+                  <a:txBody>
+                    <a:bodyPr/>
+                    <a:lstStyle/>
+                    <a:p>
+                      <a:pPr algn="ctr" fontAlgn="b"/>
+                      <a:r>
+                        <a:rPr lang="en-US" sz="1100" b="0" i="0" u="none" strike="noStrike">
+                          <a:solidFill>
+                            <a:srgbClr val="000000"/>
+                          </a:solidFill>
+                          <a:effectLst/>
+                          <a:latin typeface="Calibri" panose="020F0502020204030204" pitchFamily="34" charset="0"/>
+                        </a:rPr>
+                        <a:t>Gradient Boosting</a:t>
+                      </a:r>
+                    </a:p>
+                  </a:txBody>
+                  <a:tcPr marL="9525" marR="9525" marT="9525" marB="0" anchor="b">
+                    <a:lnL w="6350" cap="flat" cmpd="sng" algn="ctr">
+                      <a:solidFill>
+                        <a:srgbClr val="000000"/>
+                      </a:solidFill>
+                      <a:prstDash val="solid"/>
+                      <a:round/>
+                      <a:headEnd type="none" w="med" len="med"/>
+                      <a:tailEnd type="none" w="med" len="med"/>
+                    </a:lnL>
+                    <a:lnR w="6350" cap="flat" cmpd="sng" algn="ctr">
+                      <a:solidFill>
+                        <a:srgbClr val="000000"/>
+                      </a:solidFill>
+                      <a:prstDash val="solid"/>
+                      <a:round/>
+                      <a:headEnd type="none" w="med" len="med"/>
+                      <a:tailEnd type="none" w="med" len="med"/>
+                    </a:lnR>
+                    <a:lnT w="6350" cap="flat" cmpd="sng" algn="ctr">
+                      <a:solidFill>
+                        <a:srgbClr val="000000"/>
+                      </a:solidFill>
+                      <a:prstDash val="solid"/>
+                      <a:round/>
+                      <a:headEnd type="none" w="med" len="med"/>
+                      <a:tailEnd type="none" w="med" len="med"/>
+                    </a:lnT>
+                    <a:lnB w="6350" cap="flat" cmpd="sng" algn="ctr">
+                      <a:solidFill>
+                        <a:srgbClr val="000000"/>
+                      </a:solidFill>
+                      <a:prstDash val="solid"/>
+                      <a:round/>
+                      <a:headEnd type="none" w="med" len="med"/>
+                      <a:tailEnd type="none" w="med" len="med"/>
+                    </a:lnB>
+                  </a:tcPr>
+                </a:tc>
+                <a:tc>
+                  <a:txBody>
+                    <a:bodyPr/>
+                    <a:lstStyle/>
+                    <a:p>
+                      <a:pPr algn="r" fontAlgn="b"/>
+                      <a:r>
+                        <a:rPr lang="en-US" sz="1100" b="0" i="0" u="none" strike="noStrike">
+                          <a:solidFill>
+                            <a:srgbClr val="000000"/>
+                          </a:solidFill>
+                          <a:effectLst/>
+                          <a:latin typeface="Calibri" panose="020F0502020204030204" pitchFamily="34" charset="0"/>
+                        </a:rPr>
+                        <a:t>0.9013</a:t>
+                      </a:r>
+                    </a:p>
+                  </a:txBody>
+                  <a:tcPr marL="9525" marR="9525" marT="9525" marB="0" anchor="b">
+                    <a:lnL w="6350" cap="flat" cmpd="sng" algn="ctr">
+                      <a:solidFill>
+                        <a:srgbClr val="000000"/>
+                      </a:solidFill>
+                      <a:prstDash val="solid"/>
+                      <a:round/>
+                      <a:headEnd type="none" w="med" len="med"/>
+                      <a:tailEnd type="none" w="med" len="med"/>
+                    </a:lnL>
+                    <a:lnR w="6350" cap="flat" cmpd="sng" algn="ctr">
+                      <a:solidFill>
+                        <a:srgbClr val="000000"/>
+                      </a:solidFill>
+                      <a:prstDash val="solid"/>
+                      <a:round/>
+                      <a:headEnd type="none" w="med" len="med"/>
+                      <a:tailEnd type="none" w="med" len="med"/>
+                    </a:lnR>
+                    <a:lnT w="6350" cap="flat" cmpd="sng" algn="ctr">
+                      <a:solidFill>
+                        <a:srgbClr val="000000"/>
+                      </a:solidFill>
+                      <a:prstDash val="solid"/>
+                      <a:round/>
+                      <a:headEnd type="none" w="med" len="med"/>
+                      <a:tailEnd type="none" w="med" len="med"/>
+                    </a:lnT>
+                    <a:lnB w="6350" cap="flat" cmpd="sng" algn="ctr">
+                      <a:solidFill>
+                        <a:srgbClr val="000000"/>
+                      </a:solidFill>
+                      <a:prstDash val="solid"/>
+                      <a:round/>
+                      <a:headEnd type="none" w="med" len="med"/>
+                      <a:tailEnd type="none" w="med" len="med"/>
+                    </a:lnB>
+                  </a:tcPr>
+                </a:tc>
+                <a:tc>
+                  <a:txBody>
+                    <a:bodyPr/>
+                    <a:lstStyle/>
+                    <a:p>
+                      <a:pPr algn="r" fontAlgn="b"/>
+                      <a:r>
+                        <a:rPr lang="en-US" sz="1100" b="0" i="0" u="none" strike="noStrike">
+                          <a:solidFill>
+                            <a:srgbClr val="000000"/>
+                          </a:solidFill>
+                          <a:effectLst/>
+                          <a:latin typeface="Calibri" panose="020F0502020204030204" pitchFamily="34" charset="0"/>
+                        </a:rPr>
+                        <a:t>109,038.20</a:t>
+                      </a:r>
+                    </a:p>
+                  </a:txBody>
+                  <a:tcPr marL="9525" marR="9525" marT="9525" marB="0" anchor="b">
+                    <a:lnL w="6350" cap="flat" cmpd="sng" algn="ctr">
+                      <a:solidFill>
+                        <a:srgbClr val="000000"/>
+                      </a:solidFill>
+                      <a:prstDash val="solid"/>
+                      <a:round/>
+                      <a:headEnd type="none" w="med" len="med"/>
+                      <a:tailEnd type="none" w="med" len="med"/>
+                    </a:lnL>
+                    <a:lnR w="6350" cap="flat" cmpd="sng" algn="ctr">
+                      <a:solidFill>
+                        <a:srgbClr val="000000"/>
+                      </a:solidFill>
+                      <a:prstDash val="solid"/>
+                      <a:round/>
+                      <a:headEnd type="none" w="med" len="med"/>
+                      <a:tailEnd type="none" w="med" len="med"/>
+                    </a:lnR>
+                    <a:lnT w="6350" cap="flat" cmpd="sng" algn="ctr">
+                      <a:solidFill>
+                        <a:srgbClr val="000000"/>
+                      </a:solidFill>
+                      <a:prstDash val="solid"/>
+                      <a:round/>
+                      <a:headEnd type="none" w="med" len="med"/>
+                      <a:tailEnd type="none" w="med" len="med"/>
+                    </a:lnT>
+                    <a:lnB w="6350" cap="flat" cmpd="sng" algn="ctr">
+                      <a:solidFill>
+                        <a:srgbClr val="000000"/>
+                      </a:solidFill>
+                      <a:prstDash val="solid"/>
+                      <a:round/>
+                      <a:headEnd type="none" w="med" len="med"/>
+                      <a:tailEnd type="none" w="med" len="med"/>
+                    </a:lnB>
+                  </a:tcPr>
+                </a:tc>
+                <a:tc>
+                  <a:txBody>
+                    <a:bodyPr/>
+                    <a:lstStyle/>
+                    <a:p>
+                      <a:pPr algn="r" fontAlgn="b"/>
+                      <a:r>
+                        <a:rPr lang="en-US" sz="1100" b="0" i="0" u="none" strike="noStrike">
+                          <a:solidFill>
+                            <a:srgbClr val="000000"/>
+                          </a:solidFill>
+                          <a:effectLst/>
+                          <a:latin typeface="Calibri" panose="020F0502020204030204" pitchFamily="34" charset="0"/>
+                        </a:rPr>
+                        <a:t>198.64</a:t>
+                      </a:r>
+                    </a:p>
+                  </a:txBody>
+                  <a:tcPr marL="9525" marR="9525" marT="9525" marB="0" anchor="b">
+                    <a:lnL w="6350" cap="flat" cmpd="sng" algn="ctr">
+                      <a:solidFill>
+                        <a:srgbClr val="000000"/>
+                      </a:solidFill>
+                      <a:prstDash val="solid"/>
+                      <a:round/>
+                      <a:headEnd type="none" w="med" len="med"/>
+                      <a:tailEnd type="none" w="med" len="med"/>
+                    </a:lnL>
+                    <a:lnR w="6350" cap="flat" cmpd="sng" algn="ctr">
+                      <a:solidFill>
+                        <a:srgbClr val="000000"/>
+                      </a:solidFill>
+                      <a:prstDash val="solid"/>
+                      <a:round/>
+                      <a:headEnd type="none" w="med" len="med"/>
+                      <a:tailEnd type="none" w="med" len="med"/>
+                    </a:lnR>
+                    <a:lnT w="6350" cap="flat" cmpd="sng" algn="ctr">
+                      <a:solidFill>
+                        <a:srgbClr val="000000"/>
+                      </a:solidFill>
+                      <a:prstDash val="solid"/>
+                      <a:round/>
+                      <a:headEnd type="none" w="med" len="med"/>
+                      <a:tailEnd type="none" w="med" len="med"/>
+                    </a:lnT>
+                    <a:lnB w="6350" cap="flat" cmpd="sng" algn="ctr">
+                      <a:solidFill>
+                        <a:srgbClr val="000000"/>
+                      </a:solidFill>
+                      <a:prstDash val="solid"/>
+                      <a:round/>
+                      <a:headEnd type="none" w="med" len="med"/>
+                      <a:tailEnd type="none" w="med" len="med"/>
+                    </a:lnB>
+                  </a:tcPr>
+                </a:tc>
+                <a:extLst>
+                  <a:ext uri="{0D108BD9-81ED-4DB2-BD59-A6C34878D82A}">
+                    <a16:rowId xmlns:a16="http://schemas.microsoft.com/office/drawing/2014/main" val="3285150739"/>
+                  </a:ext>
+                </a:extLst>
+              </a:tr>
+              <a:tr h="351405">
+                <a:tc>
+                  <a:txBody>
+                    <a:bodyPr/>
+                    <a:lstStyle/>
+                    <a:p>
+                      <a:pPr algn="ctr" fontAlgn="b"/>
+                      <a:r>
+                        <a:rPr lang="en-US" sz="1100" b="0" i="0" u="none" strike="noStrike">
+                          <a:solidFill>
+                            <a:srgbClr val="000000"/>
+                          </a:solidFill>
+                          <a:effectLst/>
+                          <a:latin typeface="Calibri" panose="020F0502020204030204" pitchFamily="34" charset="0"/>
+                        </a:rPr>
+                        <a:t>Random Forest</a:t>
+                      </a:r>
+                    </a:p>
+                  </a:txBody>
+                  <a:tcPr marL="9525" marR="9525" marT="9525" marB="0" anchor="b">
+                    <a:lnL w="6350" cap="flat" cmpd="sng" algn="ctr">
+                      <a:solidFill>
+                        <a:srgbClr val="000000"/>
+                      </a:solidFill>
+                      <a:prstDash val="solid"/>
+                      <a:round/>
+                      <a:headEnd type="none" w="med" len="med"/>
+                      <a:tailEnd type="none" w="med" len="med"/>
+                    </a:lnL>
+                    <a:lnR w="6350" cap="flat" cmpd="sng" algn="ctr">
+                      <a:solidFill>
+                        <a:srgbClr val="000000"/>
+                      </a:solidFill>
+                      <a:prstDash val="solid"/>
+                      <a:round/>
+                      <a:headEnd type="none" w="med" len="med"/>
+                      <a:tailEnd type="none" w="med" len="med"/>
+                    </a:lnR>
+                    <a:lnT w="6350" cap="flat" cmpd="sng" algn="ctr">
+                      <a:solidFill>
+                        <a:srgbClr val="000000"/>
+                      </a:solidFill>
+                      <a:prstDash val="solid"/>
+                      <a:round/>
+                      <a:headEnd type="none" w="med" len="med"/>
+                      <a:tailEnd type="none" w="med" len="med"/>
+                    </a:lnT>
+                    <a:lnB w="6350" cap="flat" cmpd="sng" algn="ctr">
+                      <a:solidFill>
+                        <a:srgbClr val="000000"/>
+                      </a:solidFill>
+                      <a:prstDash val="solid"/>
+                      <a:round/>
+                      <a:headEnd type="none" w="med" len="med"/>
+                      <a:tailEnd type="none" w="med" len="med"/>
+                    </a:lnB>
+                    <a:solidFill>
+                      <a:srgbClr val="DDEBF7"/>
+                    </a:solidFill>
+                  </a:tcPr>
+                </a:tc>
+                <a:tc>
+                  <a:txBody>
+                    <a:bodyPr/>
+                    <a:lstStyle/>
+                    <a:p>
+                      <a:pPr algn="r" fontAlgn="b"/>
+                      <a:r>
+                        <a:rPr lang="en-US" sz="1100" b="0" i="0" u="none" strike="noStrike">
+                          <a:solidFill>
+                            <a:srgbClr val="000000"/>
+                          </a:solidFill>
+                          <a:effectLst/>
+                          <a:latin typeface="Calibri" panose="020F0502020204030204" pitchFamily="34" charset="0"/>
+                        </a:rPr>
+                        <a:t>0.8911</a:t>
+                      </a:r>
+                    </a:p>
+                  </a:txBody>
+                  <a:tcPr marL="9525" marR="9525" marT="9525" marB="0" anchor="b">
+                    <a:lnL w="6350" cap="flat" cmpd="sng" algn="ctr">
+                      <a:solidFill>
+                        <a:srgbClr val="000000"/>
+                      </a:solidFill>
+                      <a:prstDash val="solid"/>
+                      <a:round/>
+                      <a:headEnd type="none" w="med" len="med"/>
+                      <a:tailEnd type="none" w="med" len="med"/>
+                    </a:lnL>
+                    <a:lnR w="6350" cap="flat" cmpd="sng" algn="ctr">
+                      <a:solidFill>
+                        <a:srgbClr val="000000"/>
+                      </a:solidFill>
+                      <a:prstDash val="solid"/>
+                      <a:round/>
+                      <a:headEnd type="none" w="med" len="med"/>
+                      <a:tailEnd type="none" w="med" len="med"/>
+                    </a:lnR>
+                    <a:lnT w="6350" cap="flat" cmpd="sng" algn="ctr">
+                      <a:solidFill>
+                        <a:srgbClr val="000000"/>
+                      </a:solidFill>
+                      <a:prstDash val="solid"/>
+                      <a:round/>
+                      <a:headEnd type="none" w="med" len="med"/>
+                      <a:tailEnd type="none" w="med" len="med"/>
+                    </a:lnT>
+                    <a:lnB w="6350" cap="flat" cmpd="sng" algn="ctr">
+                      <a:solidFill>
+                        <a:srgbClr val="000000"/>
+                      </a:solidFill>
+                      <a:prstDash val="solid"/>
+                      <a:round/>
+                      <a:headEnd type="none" w="med" len="med"/>
+                      <a:tailEnd type="none" w="med" len="med"/>
+                    </a:lnB>
+                    <a:solidFill>
+                      <a:srgbClr val="DDEBF7"/>
+                    </a:solidFill>
+                  </a:tcPr>
+                </a:tc>
+                <a:tc>
+                  <a:txBody>
+                    <a:bodyPr/>
+                    <a:lstStyle/>
+                    <a:p>
+                      <a:pPr algn="r" fontAlgn="b"/>
+                      <a:r>
+                        <a:rPr lang="en-US" sz="1100" b="0" i="0" u="none" strike="noStrike">
+                          <a:solidFill>
+                            <a:srgbClr val="000000"/>
+                          </a:solidFill>
+                          <a:effectLst/>
+                          <a:latin typeface="Calibri" panose="020F0502020204030204" pitchFamily="34" charset="0"/>
+                        </a:rPr>
+                        <a:t>120,261.95</a:t>
+                      </a:r>
+                    </a:p>
+                  </a:txBody>
+                  <a:tcPr marL="9525" marR="9525" marT="9525" marB="0" anchor="b">
+                    <a:lnL w="6350" cap="flat" cmpd="sng" algn="ctr">
+                      <a:solidFill>
+                        <a:srgbClr val="000000"/>
+                      </a:solidFill>
+                      <a:prstDash val="solid"/>
+                      <a:round/>
+                      <a:headEnd type="none" w="med" len="med"/>
+                      <a:tailEnd type="none" w="med" len="med"/>
+                    </a:lnL>
+                    <a:lnR w="6350" cap="flat" cmpd="sng" algn="ctr">
+                      <a:solidFill>
+                        <a:srgbClr val="000000"/>
+                      </a:solidFill>
+                      <a:prstDash val="solid"/>
+                      <a:round/>
+                      <a:headEnd type="none" w="med" len="med"/>
+                      <a:tailEnd type="none" w="med" len="med"/>
+                    </a:lnR>
+                    <a:lnT w="6350" cap="flat" cmpd="sng" algn="ctr">
+                      <a:solidFill>
+                        <a:srgbClr val="000000"/>
+                      </a:solidFill>
+                      <a:prstDash val="solid"/>
+                      <a:round/>
+                      <a:headEnd type="none" w="med" len="med"/>
+                      <a:tailEnd type="none" w="med" len="med"/>
+                    </a:lnT>
+                    <a:lnB w="6350" cap="flat" cmpd="sng" algn="ctr">
+                      <a:solidFill>
+                        <a:srgbClr val="000000"/>
+                      </a:solidFill>
+                      <a:prstDash val="solid"/>
+                      <a:round/>
+                      <a:headEnd type="none" w="med" len="med"/>
+                      <a:tailEnd type="none" w="med" len="med"/>
+                    </a:lnB>
+                    <a:solidFill>
+                      <a:srgbClr val="DDEBF7"/>
+                    </a:solidFill>
+                  </a:tcPr>
+                </a:tc>
+                <a:tc>
+                  <a:txBody>
+                    <a:bodyPr/>
+                    <a:lstStyle/>
+                    <a:p>
+                      <a:pPr algn="r" fontAlgn="b"/>
+                      <a:r>
+                        <a:rPr lang="en-US" sz="1100" b="0" i="0" u="none" strike="noStrike">
+                          <a:solidFill>
+                            <a:srgbClr val="000000"/>
+                          </a:solidFill>
+                          <a:effectLst/>
+                          <a:latin typeface="Calibri" panose="020F0502020204030204" pitchFamily="34" charset="0"/>
+                        </a:rPr>
+                        <a:t>210.62</a:t>
+                      </a:r>
+                    </a:p>
+                  </a:txBody>
+                  <a:tcPr marL="9525" marR="9525" marT="9525" marB="0" anchor="b">
+                    <a:lnL w="6350" cap="flat" cmpd="sng" algn="ctr">
+                      <a:solidFill>
+                        <a:srgbClr val="000000"/>
+                      </a:solidFill>
+                      <a:prstDash val="solid"/>
+                      <a:round/>
+                      <a:headEnd type="none" w="med" len="med"/>
+                      <a:tailEnd type="none" w="med" len="med"/>
+                    </a:lnL>
+                    <a:lnR w="6350" cap="flat" cmpd="sng" algn="ctr">
+                      <a:solidFill>
+                        <a:srgbClr val="000000"/>
+                      </a:solidFill>
+                      <a:prstDash val="solid"/>
+                      <a:round/>
+                      <a:headEnd type="none" w="med" len="med"/>
+                      <a:tailEnd type="none" w="med" len="med"/>
+                    </a:lnR>
+                    <a:lnT w="6350" cap="flat" cmpd="sng" algn="ctr">
+                      <a:solidFill>
+                        <a:srgbClr val="000000"/>
+                      </a:solidFill>
+                      <a:prstDash val="solid"/>
+                      <a:round/>
+                      <a:headEnd type="none" w="med" len="med"/>
+                      <a:tailEnd type="none" w="med" len="med"/>
+                    </a:lnT>
+                    <a:lnB w="6350" cap="flat" cmpd="sng" algn="ctr">
+                      <a:solidFill>
+                        <a:srgbClr val="000000"/>
+                      </a:solidFill>
+                      <a:prstDash val="solid"/>
+                      <a:round/>
+                      <a:headEnd type="none" w="med" len="med"/>
+                      <a:tailEnd type="none" w="med" len="med"/>
+                    </a:lnB>
+                    <a:solidFill>
+                      <a:srgbClr val="DDEBF7"/>
+                    </a:solidFill>
+                  </a:tcPr>
+                </a:tc>
+                <a:extLst>
+                  <a:ext uri="{0D108BD9-81ED-4DB2-BD59-A6C34878D82A}">
+                    <a16:rowId xmlns:a16="http://schemas.microsoft.com/office/drawing/2014/main" val="770436799"/>
+                  </a:ext>
+                </a:extLst>
+              </a:tr>
+              <a:tr h="351405">
+                <a:tc>
+                  <a:txBody>
+                    <a:bodyPr/>
+                    <a:lstStyle/>
+                    <a:p>
+                      <a:pPr algn="ctr" fontAlgn="b"/>
+                      <a:r>
+                        <a:rPr lang="en-US" sz="1100" b="0" i="0" u="none" strike="noStrike">
+                          <a:solidFill>
+                            <a:srgbClr val="000000"/>
+                          </a:solidFill>
+                          <a:effectLst/>
+                          <a:latin typeface="Calibri" panose="020F0502020204030204" pitchFamily="34" charset="0"/>
+                        </a:rPr>
+                        <a:t>Linear Regression</a:t>
+                      </a:r>
+                    </a:p>
+                  </a:txBody>
+                  <a:tcPr marL="9525" marR="9525" marT="9525" marB="0" anchor="b">
+                    <a:lnL w="6350" cap="flat" cmpd="sng" algn="ctr">
+                      <a:solidFill>
+                        <a:srgbClr val="000000"/>
+                      </a:solidFill>
+                      <a:prstDash val="solid"/>
+                      <a:round/>
+                      <a:headEnd type="none" w="med" len="med"/>
+                      <a:tailEnd type="none" w="med" len="med"/>
+                    </a:lnL>
+                    <a:lnR w="6350" cap="flat" cmpd="sng" algn="ctr">
+                      <a:solidFill>
+                        <a:srgbClr val="000000"/>
+                      </a:solidFill>
+                      <a:prstDash val="solid"/>
+                      <a:round/>
+                      <a:headEnd type="none" w="med" len="med"/>
+                      <a:tailEnd type="none" w="med" len="med"/>
+                    </a:lnR>
+                    <a:lnT w="6350" cap="flat" cmpd="sng" algn="ctr">
+                      <a:solidFill>
+                        <a:srgbClr val="000000"/>
+                      </a:solidFill>
+                      <a:prstDash val="solid"/>
+                      <a:round/>
+                      <a:headEnd type="none" w="med" len="med"/>
+                      <a:tailEnd type="none" w="med" len="med"/>
+                    </a:lnT>
+                    <a:lnB w="6350" cap="flat" cmpd="sng" algn="ctr">
+                      <a:solidFill>
+                        <a:srgbClr val="000000"/>
+                      </a:solidFill>
+                      <a:prstDash val="solid"/>
+                      <a:round/>
+                      <a:headEnd type="none" w="med" len="med"/>
+                      <a:tailEnd type="none" w="med" len="med"/>
+                    </a:lnB>
+                  </a:tcPr>
+                </a:tc>
+                <a:tc>
+                  <a:txBody>
+                    <a:bodyPr/>
+                    <a:lstStyle/>
+                    <a:p>
+                      <a:pPr algn="r" fontAlgn="b"/>
+                      <a:r>
+                        <a:rPr lang="en-US" sz="1100" b="0" i="0" u="none" strike="noStrike">
+                          <a:solidFill>
+                            <a:srgbClr val="000000"/>
+                          </a:solidFill>
+                          <a:effectLst/>
+                          <a:latin typeface="Calibri" panose="020F0502020204030204" pitchFamily="34" charset="0"/>
+                        </a:rPr>
+                        <a:t>0.7999</a:t>
+                      </a:r>
+                    </a:p>
+                  </a:txBody>
+                  <a:tcPr marL="9525" marR="9525" marT="9525" marB="0" anchor="b">
+                    <a:lnL w="6350" cap="flat" cmpd="sng" algn="ctr">
+                      <a:solidFill>
+                        <a:srgbClr val="000000"/>
+                      </a:solidFill>
+                      <a:prstDash val="solid"/>
+                      <a:round/>
+                      <a:headEnd type="none" w="med" len="med"/>
+                      <a:tailEnd type="none" w="med" len="med"/>
+                    </a:lnL>
+                    <a:lnR w="6350" cap="flat" cmpd="sng" algn="ctr">
+                      <a:solidFill>
+                        <a:srgbClr val="000000"/>
+                      </a:solidFill>
+                      <a:prstDash val="solid"/>
+                      <a:round/>
+                      <a:headEnd type="none" w="med" len="med"/>
+                      <a:tailEnd type="none" w="med" len="med"/>
+                    </a:lnR>
+                    <a:lnT w="6350" cap="flat" cmpd="sng" algn="ctr">
+                      <a:solidFill>
+                        <a:srgbClr val="000000"/>
+                      </a:solidFill>
+                      <a:prstDash val="solid"/>
+                      <a:round/>
+                      <a:headEnd type="none" w="med" len="med"/>
+                      <a:tailEnd type="none" w="med" len="med"/>
+                    </a:lnT>
+                    <a:lnB w="6350" cap="flat" cmpd="sng" algn="ctr">
+                      <a:solidFill>
+                        <a:srgbClr val="000000"/>
+                      </a:solidFill>
+                      <a:prstDash val="solid"/>
+                      <a:round/>
+                      <a:headEnd type="none" w="med" len="med"/>
+                      <a:tailEnd type="none" w="med" len="med"/>
+                    </a:lnB>
+                  </a:tcPr>
+                </a:tc>
+                <a:tc>
+                  <a:txBody>
+                    <a:bodyPr/>
+                    <a:lstStyle/>
+                    <a:p>
+                      <a:pPr algn="r" fontAlgn="b"/>
+                      <a:r>
+                        <a:rPr lang="en-US" sz="1100" b="0" i="0" u="none" strike="noStrike">
+                          <a:solidFill>
+                            <a:srgbClr val="000000"/>
+                          </a:solidFill>
+                          <a:effectLst/>
+                          <a:latin typeface="Calibri" panose="020F0502020204030204" pitchFamily="34" charset="0"/>
+                        </a:rPr>
+                        <a:t>221,027.18</a:t>
+                      </a:r>
+                    </a:p>
+                  </a:txBody>
+                  <a:tcPr marL="9525" marR="9525" marT="9525" marB="0" anchor="b">
+                    <a:lnL w="6350" cap="flat" cmpd="sng" algn="ctr">
+                      <a:solidFill>
+                        <a:srgbClr val="000000"/>
+                      </a:solidFill>
+                      <a:prstDash val="solid"/>
+                      <a:round/>
+                      <a:headEnd type="none" w="med" len="med"/>
+                      <a:tailEnd type="none" w="med" len="med"/>
+                    </a:lnL>
+                    <a:lnR w="6350" cap="flat" cmpd="sng" algn="ctr">
+                      <a:solidFill>
+                        <a:srgbClr val="000000"/>
+                      </a:solidFill>
+                      <a:prstDash val="solid"/>
+                      <a:round/>
+                      <a:headEnd type="none" w="med" len="med"/>
+                      <a:tailEnd type="none" w="med" len="med"/>
+                    </a:lnR>
+                    <a:lnT w="6350" cap="flat" cmpd="sng" algn="ctr">
+                      <a:solidFill>
+                        <a:srgbClr val="000000"/>
+                      </a:solidFill>
+                      <a:prstDash val="solid"/>
+                      <a:round/>
+                      <a:headEnd type="none" w="med" len="med"/>
+                      <a:tailEnd type="none" w="med" len="med"/>
+                    </a:lnT>
+                    <a:lnB w="6350" cap="flat" cmpd="sng" algn="ctr">
+                      <a:solidFill>
+                        <a:srgbClr val="000000"/>
+                      </a:solidFill>
+                      <a:prstDash val="solid"/>
+                      <a:round/>
+                      <a:headEnd type="none" w="med" len="med"/>
+                      <a:tailEnd type="none" w="med" len="med"/>
+                    </a:lnB>
+                  </a:tcPr>
+                </a:tc>
+                <a:tc>
+                  <a:txBody>
+                    <a:bodyPr/>
+                    <a:lstStyle/>
+                    <a:p>
+                      <a:pPr algn="r" fontAlgn="b"/>
+                      <a:r>
+                        <a:rPr lang="en-US" sz="1100" b="0" i="0" u="none" strike="noStrike">
+                          <a:solidFill>
+                            <a:srgbClr val="000000"/>
+                          </a:solidFill>
+                          <a:effectLst/>
+                          <a:latin typeface="Calibri" panose="020F0502020204030204" pitchFamily="34" charset="0"/>
+                        </a:rPr>
+                        <a:t>327.77</a:t>
+                      </a:r>
+                    </a:p>
+                  </a:txBody>
+                  <a:tcPr marL="9525" marR="9525" marT="9525" marB="0" anchor="b">
+                    <a:lnL w="6350" cap="flat" cmpd="sng" algn="ctr">
+                      <a:solidFill>
+                        <a:srgbClr val="000000"/>
+                      </a:solidFill>
+                      <a:prstDash val="solid"/>
+                      <a:round/>
+                      <a:headEnd type="none" w="med" len="med"/>
+                      <a:tailEnd type="none" w="med" len="med"/>
+                    </a:lnL>
+                    <a:lnR w="6350" cap="flat" cmpd="sng" algn="ctr">
+                      <a:solidFill>
+                        <a:srgbClr val="000000"/>
+                      </a:solidFill>
+                      <a:prstDash val="solid"/>
+                      <a:round/>
+                      <a:headEnd type="none" w="med" len="med"/>
+                      <a:tailEnd type="none" w="med" len="med"/>
+                    </a:lnR>
+                    <a:lnT w="6350" cap="flat" cmpd="sng" algn="ctr">
+                      <a:solidFill>
+                        <a:srgbClr val="000000"/>
+                      </a:solidFill>
+                      <a:prstDash val="solid"/>
+                      <a:round/>
+                      <a:headEnd type="none" w="med" len="med"/>
+                      <a:tailEnd type="none" w="med" len="med"/>
+                    </a:lnT>
+                    <a:lnB w="6350" cap="flat" cmpd="sng" algn="ctr">
+                      <a:solidFill>
+                        <a:srgbClr val="000000"/>
+                      </a:solidFill>
+                      <a:prstDash val="solid"/>
+                      <a:round/>
+                      <a:headEnd type="none" w="med" len="med"/>
+                      <a:tailEnd type="none" w="med" len="med"/>
+                    </a:lnB>
+                  </a:tcPr>
+                </a:tc>
+                <a:extLst>
+                  <a:ext uri="{0D108BD9-81ED-4DB2-BD59-A6C34878D82A}">
+                    <a16:rowId xmlns:a16="http://schemas.microsoft.com/office/drawing/2014/main" val="1727142046"/>
+                  </a:ext>
+                </a:extLst>
+              </a:tr>
+              <a:tr h="351405">
+                <a:tc>
+                  <a:txBody>
+                    <a:bodyPr/>
+                    <a:lstStyle/>
+                    <a:p>
+                      <a:pPr algn="ctr" fontAlgn="b"/>
+                      <a:r>
+                        <a:rPr lang="en-US" sz="1100" b="0" i="0" u="none" strike="noStrike">
+                          <a:solidFill>
+                            <a:srgbClr val="000000"/>
+                          </a:solidFill>
+                          <a:effectLst/>
+                          <a:latin typeface="Calibri" panose="020F0502020204030204" pitchFamily="34" charset="0"/>
+                        </a:rPr>
+                        <a:t>KNN</a:t>
+                      </a:r>
+                    </a:p>
+                  </a:txBody>
+                  <a:tcPr marL="9525" marR="9525" marT="9525" marB="0" anchor="b">
+                    <a:lnL w="6350" cap="flat" cmpd="sng" algn="ctr">
+                      <a:solidFill>
+                        <a:srgbClr val="000000"/>
+                      </a:solidFill>
+                      <a:prstDash val="solid"/>
+                      <a:round/>
+                      <a:headEnd type="none" w="med" len="med"/>
+                      <a:tailEnd type="none" w="med" len="med"/>
+                    </a:lnL>
+                    <a:lnR w="6350" cap="flat" cmpd="sng" algn="ctr">
+                      <a:solidFill>
+                        <a:srgbClr val="000000"/>
+                      </a:solidFill>
+                      <a:prstDash val="solid"/>
+                      <a:round/>
+                      <a:headEnd type="none" w="med" len="med"/>
+                      <a:tailEnd type="none" w="med" len="med"/>
+                    </a:lnR>
+                    <a:lnT w="6350" cap="flat" cmpd="sng" algn="ctr">
+                      <a:solidFill>
+                        <a:srgbClr val="000000"/>
+                      </a:solidFill>
+                      <a:prstDash val="solid"/>
+                      <a:round/>
+                      <a:headEnd type="none" w="med" len="med"/>
+                      <a:tailEnd type="none" w="med" len="med"/>
+                    </a:lnT>
+                    <a:lnB w="6350" cap="flat" cmpd="sng" algn="ctr">
+                      <a:solidFill>
+                        <a:srgbClr val="000000"/>
+                      </a:solidFill>
+                      <a:prstDash val="solid"/>
+                      <a:round/>
+                      <a:headEnd type="none" w="med" len="med"/>
+                      <a:tailEnd type="none" w="med" len="med"/>
+                    </a:lnB>
+                    <a:solidFill>
+                      <a:srgbClr val="DDEBF7"/>
+                    </a:solidFill>
+                  </a:tcPr>
+                </a:tc>
+                <a:tc>
+                  <a:txBody>
+                    <a:bodyPr/>
+                    <a:lstStyle/>
+                    <a:p>
+                      <a:pPr algn="r" fontAlgn="b"/>
+                      <a:r>
+                        <a:rPr lang="en-US" sz="1100" b="0" i="0" u="none" strike="noStrike">
+                          <a:solidFill>
+                            <a:srgbClr val="000000"/>
+                          </a:solidFill>
+                          <a:effectLst/>
+                          <a:latin typeface="Calibri" panose="020F0502020204030204" pitchFamily="34" charset="0"/>
+                        </a:rPr>
+                        <a:t>0.3162</a:t>
+                      </a:r>
+                    </a:p>
+                  </a:txBody>
+                  <a:tcPr marL="9525" marR="9525" marT="9525" marB="0" anchor="b">
+                    <a:lnL w="6350" cap="flat" cmpd="sng" algn="ctr">
+                      <a:solidFill>
+                        <a:srgbClr val="000000"/>
+                      </a:solidFill>
+                      <a:prstDash val="solid"/>
+                      <a:round/>
+                      <a:headEnd type="none" w="med" len="med"/>
+                      <a:tailEnd type="none" w="med" len="med"/>
+                    </a:lnL>
+                    <a:lnR w="6350" cap="flat" cmpd="sng" algn="ctr">
+                      <a:solidFill>
+                        <a:srgbClr val="000000"/>
+                      </a:solidFill>
+                      <a:prstDash val="solid"/>
+                      <a:round/>
+                      <a:headEnd type="none" w="med" len="med"/>
+                      <a:tailEnd type="none" w="med" len="med"/>
+                    </a:lnR>
+                    <a:lnT w="6350" cap="flat" cmpd="sng" algn="ctr">
+                      <a:solidFill>
+                        <a:srgbClr val="000000"/>
+                      </a:solidFill>
+                      <a:prstDash val="solid"/>
+                      <a:round/>
+                      <a:headEnd type="none" w="med" len="med"/>
+                      <a:tailEnd type="none" w="med" len="med"/>
+                    </a:lnT>
+                    <a:lnB w="6350" cap="flat" cmpd="sng" algn="ctr">
+                      <a:solidFill>
+                        <a:srgbClr val="000000"/>
+                      </a:solidFill>
+                      <a:prstDash val="solid"/>
+                      <a:round/>
+                      <a:headEnd type="none" w="med" len="med"/>
+                      <a:tailEnd type="none" w="med" len="med"/>
+                    </a:lnB>
+                    <a:solidFill>
+                      <a:srgbClr val="DDEBF7"/>
+                    </a:solidFill>
+                  </a:tcPr>
+                </a:tc>
+                <a:tc>
+                  <a:txBody>
+                    <a:bodyPr/>
+                    <a:lstStyle/>
+                    <a:p>
+                      <a:pPr algn="r" fontAlgn="b"/>
+                      <a:r>
+                        <a:rPr lang="en-US" sz="1100" b="0" i="0" u="none" strike="noStrike">
+                          <a:solidFill>
+                            <a:srgbClr val="000000"/>
+                          </a:solidFill>
+                          <a:effectLst/>
+                          <a:latin typeface="Calibri" panose="020F0502020204030204" pitchFamily="34" charset="0"/>
+                        </a:rPr>
+                        <a:t>755,535.86</a:t>
+                      </a:r>
+                    </a:p>
+                  </a:txBody>
+                  <a:tcPr marL="9525" marR="9525" marT="9525" marB="0" anchor="b">
+                    <a:lnL w="6350" cap="flat" cmpd="sng" algn="ctr">
+                      <a:solidFill>
+                        <a:srgbClr val="000000"/>
+                      </a:solidFill>
+                      <a:prstDash val="solid"/>
+                      <a:round/>
+                      <a:headEnd type="none" w="med" len="med"/>
+                      <a:tailEnd type="none" w="med" len="med"/>
+                    </a:lnL>
+                    <a:lnR w="6350" cap="flat" cmpd="sng" algn="ctr">
+                      <a:solidFill>
+                        <a:srgbClr val="000000"/>
+                      </a:solidFill>
+                      <a:prstDash val="solid"/>
+                      <a:round/>
+                      <a:headEnd type="none" w="med" len="med"/>
+                      <a:tailEnd type="none" w="med" len="med"/>
+                    </a:lnR>
+                    <a:lnT w="6350" cap="flat" cmpd="sng" algn="ctr">
+                      <a:solidFill>
+                        <a:srgbClr val="000000"/>
+                      </a:solidFill>
+                      <a:prstDash val="solid"/>
+                      <a:round/>
+                      <a:headEnd type="none" w="med" len="med"/>
+                      <a:tailEnd type="none" w="med" len="med"/>
+                    </a:lnT>
+                    <a:lnB w="6350" cap="flat" cmpd="sng" algn="ctr">
+                      <a:solidFill>
+                        <a:srgbClr val="000000"/>
+                      </a:solidFill>
+                      <a:prstDash val="solid"/>
+                      <a:round/>
+                      <a:headEnd type="none" w="med" len="med"/>
+                      <a:tailEnd type="none" w="med" len="med"/>
+                    </a:lnB>
+                    <a:solidFill>
+                      <a:srgbClr val="DDEBF7"/>
+                    </a:solidFill>
+                  </a:tcPr>
+                </a:tc>
+                <a:tc>
+                  <a:txBody>
+                    <a:bodyPr/>
+                    <a:lstStyle/>
+                    <a:p>
+                      <a:pPr algn="r" fontAlgn="b"/>
+                      <a:r>
+                        <a:rPr lang="en-US" sz="1100" b="0" i="0" u="none" strike="noStrike" dirty="0">
+                          <a:solidFill>
+                            <a:srgbClr val="000000"/>
+                          </a:solidFill>
+                          <a:effectLst/>
+                          <a:latin typeface="Calibri" panose="020F0502020204030204" pitchFamily="34" charset="0"/>
+                        </a:rPr>
+                        <a:t>575.79</a:t>
+                      </a:r>
+                    </a:p>
+                  </a:txBody>
+                  <a:tcPr marL="9525" marR="9525" marT="9525" marB="0" anchor="b">
+                    <a:lnL w="6350" cap="flat" cmpd="sng" algn="ctr">
+                      <a:solidFill>
+                        <a:srgbClr val="000000"/>
+                      </a:solidFill>
+                      <a:prstDash val="solid"/>
+                      <a:round/>
+                      <a:headEnd type="none" w="med" len="med"/>
+                      <a:tailEnd type="none" w="med" len="med"/>
+                    </a:lnL>
+                    <a:lnR w="6350" cap="flat" cmpd="sng" algn="ctr">
+                      <a:solidFill>
+                        <a:srgbClr val="000000"/>
+                      </a:solidFill>
+                      <a:prstDash val="solid"/>
+                      <a:round/>
+                      <a:headEnd type="none" w="med" len="med"/>
+                      <a:tailEnd type="none" w="med" len="med"/>
+                    </a:lnR>
+                    <a:lnT w="6350" cap="flat" cmpd="sng" algn="ctr">
+                      <a:solidFill>
+                        <a:srgbClr val="000000"/>
+                      </a:solidFill>
+                      <a:prstDash val="solid"/>
+                      <a:round/>
+                      <a:headEnd type="none" w="med" len="med"/>
+                      <a:tailEnd type="none" w="med" len="med"/>
+                    </a:lnT>
+                    <a:lnB w="6350" cap="flat" cmpd="sng" algn="ctr">
+                      <a:solidFill>
+                        <a:srgbClr val="000000"/>
+                      </a:solidFill>
+                      <a:prstDash val="solid"/>
+                      <a:round/>
+                      <a:headEnd type="none" w="med" len="med"/>
+                      <a:tailEnd type="none" w="med" len="med"/>
+                    </a:lnB>
+                    <a:solidFill>
+                      <a:srgbClr val="DDEBF7"/>
+                    </a:solidFill>
+                  </a:tcPr>
+                </a:tc>
+                <a:extLst>
+                  <a:ext uri="{0D108BD9-81ED-4DB2-BD59-A6C34878D82A}">
+                    <a16:rowId xmlns:a16="http://schemas.microsoft.com/office/drawing/2014/main" val="1456283292"/>
+                  </a:ext>
+                </a:extLst>
+              </a:tr>
+            </a:tbl>
+          </a:graphicData>
+        </a:graphic>
+      </p:graphicFrame>
       <p:pic>
         <p:nvPicPr>
-          <p:cNvPr id="8" name="Picture 7">
+          <p:cNvPr id="15" name="Picture 14">
             <a:extLst>
               <a:ext uri="{FF2B5EF4-FFF2-40B4-BE49-F238E27FC236}">
-                <a16:creationId xmlns:a16="http://schemas.microsoft.com/office/drawing/2014/main" id="{2992DF55-D7D5-4CFB-B45A-911302F1C0B3}"/>
+                <a16:creationId xmlns:a16="http://schemas.microsoft.com/office/drawing/2014/main" id="{F453886A-5674-40FA-8855-F9F169530305}"/>
               </a:ext>
             </a:extLst>
           </p:cNvPr>
@@ -4874,63 +6206,25 @@
           <p:nvPr/>
         </p:nvPicPr>
         <p:blipFill>
-          <a:blip r:embed="rId4"/>
+          <a:blip r:embed="rId3"/>
           <a:stretch>
             <a:fillRect/>
           </a:stretch>
         </p:blipFill>
         <p:spPr>
           <a:xfrm>
-            <a:off x="6767085" y="2279416"/>
-            <a:ext cx="4072131" cy="3641098"/>
+            <a:off x="6573988" y="2121873"/>
+            <a:ext cx="4219575" cy="3648075"/>
           </a:xfrm>
           <a:prstGeom prst="rect">
             <a:avLst/>
           </a:prstGeom>
         </p:spPr>
       </p:pic>
-      <p:sp>
-        <p:nvSpPr>
-          <p:cNvPr id="5" name="TextBox 4">
-            <a:extLst>
-              <a:ext uri="{FF2B5EF4-FFF2-40B4-BE49-F238E27FC236}">
-                <a16:creationId xmlns:a16="http://schemas.microsoft.com/office/drawing/2014/main" id="{4E176127-3A69-4CF0-A655-9C2624E90B7B}"/>
-              </a:ext>
-            </a:extLst>
-          </p:cNvPr>
-          <p:cNvSpPr txBox="1"/>
-          <p:nvPr/>
-        </p:nvSpPr>
-        <p:spPr>
-          <a:xfrm>
-            <a:off x="1352784" y="4565774"/>
-            <a:ext cx="4743216" cy="923330"/>
-          </a:xfrm>
-          <a:prstGeom prst="rect">
-            <a:avLst/>
-          </a:prstGeom>
-          <a:noFill/>
-        </p:spPr>
-        <p:txBody>
-          <a:bodyPr wrap="square" rtlCol="0">
-            <a:spAutoFit/>
-          </a:bodyPr>
-          <a:lstStyle/>
-          <a:p>
-            <a:r>
-              <a:rPr lang="en-US" dirty="0"/>
-              <a:t>Of all four models, Gradient Boosting has the highest accuracy.</a:t>
-            </a:r>
-          </a:p>
-          <a:p>
-            <a:endParaRPr lang="en-US" dirty="0"/>
-          </a:p>
-        </p:txBody>
-      </p:sp>
     </p:spTree>
     <p:extLst>
       <p:ext uri="{BB962C8B-B14F-4D97-AF65-F5344CB8AC3E}">
-        <p14:creationId xmlns:p14="http://schemas.microsoft.com/office/powerpoint/2010/main" val="1283145321"/>
+        <p14:creationId xmlns:p14="http://schemas.microsoft.com/office/powerpoint/2010/main" val="3192400708"/>
       </p:ext>
     </p:extLst>
   </p:cSld>
@@ -4984,56 +6278,22 @@
                   <a:schemeClr val="accent2"/>
                 </a:solidFill>
               </a:rPr>
-              <a:t>Conclusion</a:t>
-            </a:r>
-          </a:p>
-        </p:txBody>
-      </p:sp>
-      <p:sp>
-        <p:nvSpPr>
-          <p:cNvPr id="3" name="Content Placeholder 2">
-            <a:extLst>
-              <a:ext uri="{FF2B5EF4-FFF2-40B4-BE49-F238E27FC236}">
-                <a16:creationId xmlns:a16="http://schemas.microsoft.com/office/drawing/2014/main" id="{8838AB26-3BBB-4134-A003-9DD4CEC37F33}"/>
-              </a:ext>
-            </a:extLst>
-          </p:cNvPr>
-          <p:cNvSpPr>
-            <a:spLocks noGrp="1"/>
-          </p:cNvSpPr>
-          <p:nvPr>
-            <p:ph idx="1"/>
-          </p:nvPr>
-        </p:nvSpPr>
-        <p:spPr/>
-        <p:txBody>
-          <a:bodyPr>
-            <a:normAutofit/>
-          </a:bodyPr>
-          <a:lstStyle/>
-          <a:p>
-            <a:r>
-              <a:rPr lang="en-US" dirty="0"/>
-              <a:t>Best Machine Learning Model to predict the health insurance charge is the Gradient Boosting Regression with approx. 90% accuracy.</a:t>
-            </a:r>
-          </a:p>
-          <a:p>
-            <a:r>
-              <a:rPr lang="en-US" dirty="0"/>
-              <a:t>Gradient Boosting model shows the three most important features are:</a:t>
+              <a:t>Machine Learning Models</a:t>
             </a:r>
             <a:br>
-              <a:rPr lang="en-US" dirty="0"/>
+              <a:rPr lang="en-US" dirty="0">
+                <a:solidFill>
+                  <a:schemeClr val="accent2"/>
+                </a:solidFill>
+              </a:rPr>
             </a:br>
             <a:r>
-              <a:rPr lang="en-US" dirty="0"/>
-              <a:t>1. Smoking, 2. BMI (weight status) and 3. Age.</a:t>
-            </a:r>
-          </a:p>
-          <a:p>
-            <a:r>
-              <a:rPr lang="en-US" dirty="0"/>
-              <a:t>In this analysis, Gradient Boosting performed better than Random Forest, though difference in accuracy rate is little.  I suppose hyperparameter tuning worked in our favor.</a:t>
+              <a:rPr lang="en-US" dirty="0">
+                <a:solidFill>
+                  <a:schemeClr val="accent2"/>
+                </a:solidFill>
+              </a:rPr>
+              <a:t>(cont’d)</a:t>
             </a:r>
           </a:p>
         </p:txBody>
@@ -5074,10 +6334,75 @@
           </a:prstGeom>
         </p:spPr>
       </p:pic>
+      <p:sp>
+        <p:nvSpPr>
+          <p:cNvPr id="11" name="TextBox 10">
+            <a:extLst>
+              <a:ext uri="{FF2B5EF4-FFF2-40B4-BE49-F238E27FC236}">
+                <a16:creationId xmlns:a16="http://schemas.microsoft.com/office/drawing/2014/main" id="{FDF5936A-3F0B-472E-B46F-D9D2FACDAC37}"/>
+              </a:ext>
+            </a:extLst>
+          </p:cNvPr>
+          <p:cNvSpPr txBox="1"/>
+          <p:nvPr/>
+        </p:nvSpPr>
+        <p:spPr>
+          <a:xfrm>
+            <a:off x="1890712" y="5787957"/>
+            <a:ext cx="8410575" cy="584775"/>
+          </a:xfrm>
+          <a:prstGeom prst="rect">
+            <a:avLst/>
+          </a:prstGeom>
+          <a:noFill/>
+        </p:spPr>
+        <p:txBody>
+          <a:bodyPr wrap="square" rtlCol="0">
+            <a:spAutoFit/>
+          </a:bodyPr>
+          <a:lstStyle/>
+          <a:p>
+            <a:r>
+              <a:rPr lang="en-US" sz="1600" dirty="0"/>
+              <a:t>Predicted charges can be visually confirmed to have the strongest linear relationship in the Gradient Boosting model.</a:t>
+            </a:r>
+          </a:p>
+        </p:txBody>
+      </p:sp>
+      <p:pic>
+        <p:nvPicPr>
+          <p:cNvPr id="13" name="Picture 12">
+            <a:extLst>
+              <a:ext uri="{FF2B5EF4-FFF2-40B4-BE49-F238E27FC236}">
+                <a16:creationId xmlns:a16="http://schemas.microsoft.com/office/drawing/2014/main" id="{69FB64C2-87FA-4A46-8F11-7EB14289FCD8}"/>
+              </a:ext>
+            </a:extLst>
+          </p:cNvPr>
+          <p:cNvPicPr>
+            <a:picLocks noChangeAspect="1"/>
+          </p:cNvPicPr>
+          <p:nvPr/>
+        </p:nvPicPr>
+        <p:blipFill>
+          <a:blip r:embed="rId3"/>
+          <a:stretch>
+            <a:fillRect/>
+          </a:stretch>
+        </p:blipFill>
+        <p:spPr>
+          <a:xfrm>
+            <a:off x="1784113" y="2174508"/>
+            <a:ext cx="8448675" cy="3324225"/>
+          </a:xfrm>
+          <a:prstGeom prst="rect">
+            <a:avLst/>
+          </a:prstGeom>
+        </p:spPr>
+      </p:pic>
     </p:spTree>
     <p:extLst>
       <p:ext uri="{BB962C8B-B14F-4D97-AF65-F5344CB8AC3E}">
-        <p14:creationId xmlns:p14="http://schemas.microsoft.com/office/powerpoint/2010/main" val="3088399402"/>
+        <p14:creationId xmlns:p14="http://schemas.microsoft.com/office/powerpoint/2010/main" val="4058381673"/>
       </p:ext>
     </p:extLst>
   </p:cSld>
@@ -5131,7 +6456,7 @@
                   <a:schemeClr val="accent2"/>
                 </a:solidFill>
               </a:rPr>
-              <a:t>Future work </a:t>
+              <a:t>Conclusion</a:t>
             </a:r>
           </a:p>
         </p:txBody>
@@ -5152,12 +6477,7 @@
             <p:ph idx="1"/>
           </p:nvPr>
         </p:nvSpPr>
-        <p:spPr>
-          <a:xfrm>
-            <a:off x="2773599" y="1559859"/>
-            <a:ext cx="7958330" cy="4490085"/>
-          </a:xfrm>
-        </p:spPr>
+        <p:spPr/>
         <p:txBody>
           <a:bodyPr>
             <a:normAutofit/>
@@ -5166,13 +6486,26 @@
           <a:p>
             <a:r>
               <a:rPr lang="en-US" dirty="0"/>
-              <a:t>There is no doubt that the healthy lifestyle is the best prevention to become sick.  However, having a good health care coverage to be able to receive proper medical care is essential for a long healthy life.  We need to be able to receive preventative care, care for injuries, and some unpreventable sicknesses. </a:t>
+              <a:t>Best Machine Learning Model to predict the health insurance charge is the Gradient Boosting Regression with approx. 90% accuracy.</a:t>
             </a:r>
           </a:p>
           <a:p>
             <a:r>
               <a:rPr lang="en-US" dirty="0"/>
-              <a:t>I would like to see the data that has more demographic/lifestyle features such as race, living style/habit (example: exercise habit), history of sickness, etc..  These questions are typically asked when we get a quote for insurance, and it would be interesting to see how they affect the health insurance charges.</a:t>
+              <a:t>Gradient Boosting model shows the three most important features are:</a:t>
+            </a:r>
+            <a:br>
+              <a:rPr lang="en-US" dirty="0"/>
+            </a:br>
+            <a:r>
+              <a:rPr lang="en-US" dirty="0"/>
+              <a:t>1. Smoking, 2. BMI (weight status) and 3. Age.</a:t>
+            </a:r>
+          </a:p>
+          <a:p>
+            <a:r>
+              <a:rPr lang="en-US" dirty="0"/>
+              <a:t>In this analysis, Gradient Boosting performed better than Random Forest, though difference in accuracy rate is little.  I suppose hyperparameter tuning worked in our favor.</a:t>
             </a:r>
           </a:p>
         </p:txBody>
@@ -5216,7 +6549,7 @@
     </p:spTree>
     <p:extLst>
       <p:ext uri="{BB962C8B-B14F-4D97-AF65-F5344CB8AC3E}">
-        <p14:creationId xmlns:p14="http://schemas.microsoft.com/office/powerpoint/2010/main" val="598153960"/>
+        <p14:creationId xmlns:p14="http://schemas.microsoft.com/office/powerpoint/2010/main" val="3088399402"/>
       </p:ext>
     </p:extLst>
   </p:cSld>
@@ -5270,6 +6603,145 @@
                   <a:schemeClr val="accent2"/>
                 </a:solidFill>
               </a:rPr>
+              <a:t>Future work </a:t>
+            </a:r>
+          </a:p>
+        </p:txBody>
+      </p:sp>
+      <p:sp>
+        <p:nvSpPr>
+          <p:cNvPr id="3" name="Content Placeholder 2">
+            <a:extLst>
+              <a:ext uri="{FF2B5EF4-FFF2-40B4-BE49-F238E27FC236}">
+                <a16:creationId xmlns:a16="http://schemas.microsoft.com/office/drawing/2014/main" id="{8838AB26-3BBB-4134-A003-9DD4CEC37F33}"/>
+              </a:ext>
+            </a:extLst>
+          </p:cNvPr>
+          <p:cNvSpPr>
+            <a:spLocks noGrp="1"/>
+          </p:cNvSpPr>
+          <p:nvPr>
+            <p:ph idx="1"/>
+          </p:nvPr>
+        </p:nvSpPr>
+        <p:spPr>
+          <a:xfrm>
+            <a:off x="2773599" y="1559859"/>
+            <a:ext cx="7958330" cy="4490085"/>
+          </a:xfrm>
+        </p:spPr>
+        <p:txBody>
+          <a:bodyPr>
+            <a:normAutofit/>
+          </a:bodyPr>
+          <a:lstStyle/>
+          <a:p>
+            <a:r>
+              <a:rPr lang="en-US" dirty="0"/>
+              <a:t>There is no doubt that the healthy lifestyle is the best prevention to become sick.  However, having a good health care coverage to be able to receive proper medical care is essential for a long healthy life.  We need to be able to receive preventative care, care for injuries, and some unpreventable sicknesses. </a:t>
+            </a:r>
+          </a:p>
+          <a:p>
+            <a:r>
+              <a:rPr lang="en-US" dirty="0"/>
+              <a:t>I would like to see the data that has more demographic/lifestyle features such as race, living style/habit (example: exercise habit), history of sickness, etc..  These questions are typically asked when we get a quote for insurance, and it would be interesting to see how they affect the health insurance charges.</a:t>
+            </a:r>
+          </a:p>
+        </p:txBody>
+      </p:sp>
+      <p:pic>
+        <p:nvPicPr>
+          <p:cNvPr id="4" name="Picture 3">
+            <a:extLst>
+              <a:ext uri="{FF2B5EF4-FFF2-40B4-BE49-F238E27FC236}">
+                <a16:creationId xmlns:a16="http://schemas.microsoft.com/office/drawing/2014/main" id="{F60B8DD0-A5EE-411B-873C-2FA17651A9BE}"/>
+              </a:ext>
+            </a:extLst>
+          </p:cNvPr>
+          <p:cNvPicPr>
+            <a:picLocks noChangeAspect="1"/>
+          </p:cNvPicPr>
+          <p:nvPr/>
+        </p:nvPicPr>
+        <p:blipFill>
+          <a:blip r:embed="rId2">
+            <a:extLst>
+              <a:ext uri="{28A0092B-C50C-407E-A947-70E740481C1C}">
+                <a14:useLocalDpi xmlns:a14="http://schemas.microsoft.com/office/drawing/2010/main" val="0"/>
+              </a:ext>
+            </a:extLst>
+          </a:blip>
+          <a:stretch>
+            <a:fillRect/>
+          </a:stretch>
+        </p:blipFill>
+        <p:spPr>
+          <a:xfrm>
+            <a:off x="399135" y="342247"/>
+            <a:ext cx="2212673" cy="1682349"/>
+          </a:xfrm>
+          <a:prstGeom prst="rect">
+            <a:avLst/>
+          </a:prstGeom>
+        </p:spPr>
+      </p:pic>
+    </p:spTree>
+    <p:extLst>
+      <p:ext uri="{BB962C8B-B14F-4D97-AF65-F5344CB8AC3E}">
+        <p14:creationId xmlns:p14="http://schemas.microsoft.com/office/powerpoint/2010/main" val="598153960"/>
+      </p:ext>
+    </p:extLst>
+  </p:cSld>
+  <p:clrMapOvr>
+    <a:masterClrMapping/>
+  </p:clrMapOvr>
+</p:sld>
+</file>
+
+<file path=ppt/slides/slide14.xml><?xml version="1.0" encoding="utf-8"?>
+<p:sld xmlns:a="http://schemas.openxmlformats.org/drawingml/2006/main" xmlns:r="http://schemas.openxmlformats.org/officeDocument/2006/relationships" xmlns:p="http://schemas.openxmlformats.org/presentationml/2006/main">
+  <p:cSld>
+    <p:spTree>
+      <p:nvGrpSpPr>
+        <p:cNvPr id="1" name=""/>
+        <p:cNvGrpSpPr/>
+        <p:nvPr/>
+      </p:nvGrpSpPr>
+      <p:grpSpPr>
+        <a:xfrm>
+          <a:off x="0" y="0"/>
+          <a:ext cx="0" cy="0"/>
+          <a:chOff x="0" y="0"/>
+          <a:chExt cx="0" cy="0"/>
+        </a:xfrm>
+      </p:grpSpPr>
+      <p:sp>
+        <p:nvSpPr>
+          <p:cNvPr id="2" name="Title 1">
+            <a:extLst>
+              <a:ext uri="{FF2B5EF4-FFF2-40B4-BE49-F238E27FC236}">
+                <a16:creationId xmlns:a16="http://schemas.microsoft.com/office/drawing/2014/main" id="{6F792231-6D39-4D55-AE7D-E472430AD846}"/>
+              </a:ext>
+            </a:extLst>
+          </p:cNvPr>
+          <p:cNvSpPr>
+            <a:spLocks noGrp="1"/>
+          </p:cNvSpPr>
+          <p:nvPr>
+            <p:ph type="title"/>
+          </p:nvPr>
+        </p:nvSpPr>
+        <p:spPr/>
+        <p:txBody>
+          <a:bodyPr/>
+          <a:lstStyle/>
+          <a:p>
+            <a:r>
+              <a:rPr lang="en-US" dirty="0">
+                <a:solidFill>
+                  <a:schemeClr val="accent2"/>
+                </a:solidFill>
+              </a:rPr>
               <a:t>References</a:t>
             </a:r>
           </a:p>
@@ -5480,6 +6952,46 @@
           </a:prstGeom>
         </p:spPr>
       </p:pic>
+      <p:sp>
+        <p:nvSpPr>
+          <p:cNvPr id="5" name="TextBox 4">
+            <a:extLst>
+              <a:ext uri="{FF2B5EF4-FFF2-40B4-BE49-F238E27FC236}">
+                <a16:creationId xmlns:a16="http://schemas.microsoft.com/office/drawing/2014/main" id="{F9532E36-9AE3-4A67-B6CB-76E8AF4C9917}"/>
+              </a:ext>
+            </a:extLst>
+          </p:cNvPr>
+          <p:cNvSpPr txBox="1"/>
+          <p:nvPr/>
+        </p:nvSpPr>
+        <p:spPr>
+          <a:xfrm>
+            <a:off x="1342417" y="5984483"/>
+            <a:ext cx="9377464" cy="369332"/>
+          </a:xfrm>
+          <a:prstGeom prst="rect">
+            <a:avLst/>
+          </a:prstGeom>
+          <a:noFill/>
+        </p:spPr>
+        <p:txBody>
+          <a:bodyPr wrap="square" rtlCol="0">
+            <a:spAutoFit/>
+          </a:bodyPr>
+          <a:lstStyle/>
+          <a:p>
+            <a:pPr algn="r"/>
+            <a:r>
+              <a:rPr lang="en-US" dirty="0">
+                <a:solidFill>
+                  <a:srgbClr val="00B0F0"/>
+                </a:solidFill>
+              </a:rPr>
+              <a:t>And special thanks to my Springboard mentor, David Lara Arango.</a:t>
+            </a:r>
+          </a:p>
+        </p:txBody>
+      </p:sp>
     </p:spTree>
     <p:extLst>
       <p:ext uri="{BB962C8B-B14F-4D97-AF65-F5344CB8AC3E}">
@@ -7139,7 +8651,7 @@
         </p:blipFill>
         <p:spPr>
           <a:xfrm>
-            <a:off x="828338" y="2408340"/>
+            <a:off x="866637" y="2387063"/>
             <a:ext cx="3294324" cy="2564376"/>
           </a:xfrm>
           <a:prstGeom prst="rect">
@@ -7199,7 +8711,7 @@
         </p:blipFill>
         <p:spPr>
           <a:xfrm>
-            <a:off x="4435462" y="2395863"/>
+            <a:off x="4454611" y="2417140"/>
             <a:ext cx="3381019" cy="2555576"/>
           </a:xfrm>
           <a:prstGeom prst="rect">
@@ -7417,6 +8929,651 @@
           </a:prstGeom>
         </p:spPr>
       </p:pic>
+      <p:sp>
+        <p:nvSpPr>
+          <p:cNvPr id="5" name="TextBox 4">
+            <a:extLst>
+              <a:ext uri="{FF2B5EF4-FFF2-40B4-BE49-F238E27FC236}">
+                <a16:creationId xmlns:a16="http://schemas.microsoft.com/office/drawing/2014/main" id="{67072FF4-7409-455A-8BCE-83EAADFA775B}"/>
+              </a:ext>
+            </a:extLst>
+          </p:cNvPr>
+          <p:cNvSpPr txBox="1"/>
+          <p:nvPr/>
+        </p:nvSpPr>
+        <p:spPr>
+          <a:xfrm>
+            <a:off x="1027885" y="4707253"/>
+            <a:ext cx="2971828" cy="221856"/>
+          </a:xfrm>
+          <a:prstGeom prst="rect">
+            <a:avLst/>
+          </a:prstGeom>
+          <a:solidFill>
+            <a:schemeClr val="tx1"/>
+          </a:solidFill>
+        </p:spPr>
+        <p:txBody>
+          <a:bodyPr wrap="square" rtlCol="0">
+            <a:spAutoFit/>
+          </a:bodyPr>
+          <a:lstStyle/>
+          <a:p>
+            <a:pPr>
+              <a:lnSpc>
+                <a:spcPts val="800"/>
+              </a:lnSpc>
+            </a:pPr>
+            <a:r>
+              <a:rPr lang="en-US" dirty="0"/>
+              <a:t>          </a:t>
+            </a:r>
+            <a:r>
+              <a:rPr lang="en-US" sz="800" dirty="0">
+                <a:solidFill>
+                  <a:schemeClr val="bg1"/>
+                </a:solidFill>
+              </a:rPr>
+              <a:t>No                                                 Yes</a:t>
+            </a:r>
+          </a:p>
+        </p:txBody>
+      </p:sp>
+      <p:sp>
+        <p:nvSpPr>
+          <p:cNvPr id="16" name="TextBox 15">
+            <a:extLst>
+              <a:ext uri="{FF2B5EF4-FFF2-40B4-BE49-F238E27FC236}">
+                <a16:creationId xmlns:a16="http://schemas.microsoft.com/office/drawing/2014/main" id="{D49E3839-0673-44AF-B0AD-0D1F08206EB1}"/>
+              </a:ext>
+            </a:extLst>
+          </p:cNvPr>
+          <p:cNvSpPr txBox="1"/>
+          <p:nvPr/>
+        </p:nvSpPr>
+        <p:spPr>
+          <a:xfrm>
+            <a:off x="4614719" y="4676757"/>
+            <a:ext cx="3145058" cy="231474"/>
+          </a:xfrm>
+          <a:prstGeom prst="rect">
+            <a:avLst/>
+          </a:prstGeom>
+          <a:solidFill>
+            <a:schemeClr val="tx1"/>
+          </a:solidFill>
+        </p:spPr>
+        <p:txBody>
+          <a:bodyPr wrap="square" rtlCol="0">
+            <a:spAutoFit/>
+          </a:bodyPr>
+          <a:lstStyle/>
+          <a:p>
+            <a:pPr>
+              <a:lnSpc>
+                <a:spcPts val="900"/>
+              </a:lnSpc>
+            </a:pPr>
+            <a:r>
+              <a:rPr lang="en-US" dirty="0"/>
+              <a:t>  </a:t>
+            </a:r>
+            <a:r>
+              <a:rPr lang="en-US" sz="800" dirty="0">
+                <a:solidFill>
+                  <a:schemeClr val="bg1"/>
+                </a:solidFill>
+              </a:rPr>
+              <a:t>10s             20s            30s            40s            50s            60s</a:t>
+            </a:r>
+          </a:p>
+        </p:txBody>
+      </p:sp>
+      <p:sp>
+        <p:nvSpPr>
+          <p:cNvPr id="18" name="TextBox 17">
+            <a:extLst>
+              <a:ext uri="{FF2B5EF4-FFF2-40B4-BE49-F238E27FC236}">
+                <a16:creationId xmlns:a16="http://schemas.microsoft.com/office/drawing/2014/main" id="{8B4FA721-9814-49F3-B68D-9C758DE91AA2}"/>
+              </a:ext>
+            </a:extLst>
+          </p:cNvPr>
+          <p:cNvSpPr txBox="1"/>
+          <p:nvPr/>
+        </p:nvSpPr>
+        <p:spPr>
+          <a:xfrm>
+            <a:off x="8278545" y="4487962"/>
+            <a:ext cx="3145058" cy="438582"/>
+          </a:xfrm>
+          <a:prstGeom prst="rect">
+            <a:avLst/>
+          </a:prstGeom>
+          <a:solidFill>
+            <a:schemeClr val="tx1"/>
+          </a:solidFill>
+        </p:spPr>
+        <p:txBody>
+          <a:bodyPr wrap="square" rtlCol="0">
+            <a:spAutoFit/>
+          </a:bodyPr>
+          <a:lstStyle/>
+          <a:p>
+            <a:pPr>
+              <a:lnSpc>
+                <a:spcPts val="1100"/>
+              </a:lnSpc>
+            </a:pPr>
+            <a:r>
+              <a:rPr lang="en-US" dirty="0"/>
+              <a:t>   </a:t>
+            </a:r>
+            <a:r>
+              <a:rPr lang="en-US" sz="800" dirty="0">
+                <a:solidFill>
+                  <a:schemeClr val="bg1"/>
+                </a:solidFill>
+              </a:rPr>
+              <a:t>Obese            Overweight            Normal          Underweight           </a:t>
+            </a:r>
+          </a:p>
+          <a:p>
+            <a:pPr>
+              <a:lnSpc>
+                <a:spcPts val="800"/>
+              </a:lnSpc>
+            </a:pPr>
+            <a:endParaRPr lang="en-US" sz="800" dirty="0">
+              <a:solidFill>
+                <a:schemeClr val="bg1"/>
+              </a:solidFill>
+            </a:endParaRPr>
+          </a:p>
+          <a:p>
+            <a:pPr>
+              <a:lnSpc>
+                <a:spcPts val="800"/>
+              </a:lnSpc>
+            </a:pPr>
+            <a:endParaRPr lang="en-US" sz="800" dirty="0">
+              <a:solidFill>
+                <a:schemeClr val="bg1"/>
+              </a:solidFill>
+            </a:endParaRPr>
+          </a:p>
+        </p:txBody>
+      </p:sp>
+      <p:sp>
+        <p:nvSpPr>
+          <p:cNvPr id="9" name="TextBox 8">
+            <a:extLst>
+              <a:ext uri="{FF2B5EF4-FFF2-40B4-BE49-F238E27FC236}">
+                <a16:creationId xmlns:a16="http://schemas.microsoft.com/office/drawing/2014/main" id="{33E1F730-FD0C-461B-BFB5-9DA833308C1E}"/>
+              </a:ext>
+            </a:extLst>
+          </p:cNvPr>
+          <p:cNvSpPr txBox="1"/>
+          <p:nvPr/>
+        </p:nvSpPr>
+        <p:spPr>
+          <a:xfrm>
+            <a:off x="1138136" y="2539747"/>
+            <a:ext cx="607883" cy="276999"/>
+          </a:xfrm>
+          <a:prstGeom prst="rect">
+            <a:avLst/>
+          </a:prstGeom>
+          <a:solidFill>
+            <a:schemeClr val="tx1">
+              <a:lumMod val="85000"/>
+            </a:schemeClr>
+          </a:solidFill>
+        </p:spPr>
+        <p:txBody>
+          <a:bodyPr wrap="square" rtlCol="0">
+            <a:spAutoFit/>
+          </a:bodyPr>
+          <a:lstStyle/>
+          <a:p>
+            <a:r>
+              <a:rPr lang="en-US" sz="600" dirty="0">
+                <a:solidFill>
+                  <a:schemeClr val="bg1"/>
+                </a:solidFill>
+              </a:rPr>
+              <a:t>        mean</a:t>
+            </a:r>
+          </a:p>
+          <a:p>
+            <a:r>
+              <a:rPr lang="en-US" sz="600" dirty="0">
+                <a:solidFill>
+                  <a:schemeClr val="bg1"/>
+                </a:solidFill>
+              </a:rPr>
+              <a:t>        median</a:t>
+            </a:r>
+          </a:p>
+        </p:txBody>
+      </p:sp>
+      <p:sp>
+        <p:nvSpPr>
+          <p:cNvPr id="20" name="Rectangle 19">
+            <a:extLst>
+              <a:ext uri="{FF2B5EF4-FFF2-40B4-BE49-F238E27FC236}">
+                <a16:creationId xmlns:a16="http://schemas.microsoft.com/office/drawing/2014/main" id="{2AC539A8-82CD-44C3-9055-8DD4F11F8F60}"/>
+              </a:ext>
+            </a:extLst>
+          </p:cNvPr>
+          <p:cNvSpPr/>
+          <p:nvPr/>
+        </p:nvSpPr>
+        <p:spPr>
+          <a:xfrm>
+            <a:off x="1212381" y="2691769"/>
+            <a:ext cx="130631" cy="77694"/>
+          </a:xfrm>
+          <a:prstGeom prst="rect">
+            <a:avLst/>
+          </a:prstGeom>
+          <a:solidFill>
+            <a:srgbClr val="FC8004"/>
+          </a:solidFill>
+          <a:ln>
+            <a:noFill/>
+          </a:ln>
+        </p:spPr>
+        <p:style>
+          <a:lnRef idx="2">
+            <a:schemeClr val="accent1">
+              <a:shade val="50000"/>
+            </a:schemeClr>
+          </a:lnRef>
+          <a:fillRef idx="1">
+            <a:schemeClr val="accent1"/>
+          </a:fillRef>
+          <a:effectRef idx="0">
+            <a:schemeClr val="accent1"/>
+          </a:effectRef>
+          <a:fontRef idx="minor">
+            <a:schemeClr val="lt1"/>
+          </a:fontRef>
+        </p:style>
+        <p:txBody>
+          <a:bodyPr rtlCol="0" anchor="ctr"/>
+          <a:lstStyle/>
+          <a:p>
+            <a:pPr algn="ctr"/>
+            <a:endParaRPr lang="en-US"/>
+          </a:p>
+        </p:txBody>
+      </p:sp>
+      <p:sp>
+        <p:nvSpPr>
+          <p:cNvPr id="21" name="Rectangle 20">
+            <a:extLst>
+              <a:ext uri="{FF2B5EF4-FFF2-40B4-BE49-F238E27FC236}">
+                <a16:creationId xmlns:a16="http://schemas.microsoft.com/office/drawing/2014/main" id="{CF01C87F-4ABD-47D8-9642-C952F9C4AD0C}"/>
+              </a:ext>
+            </a:extLst>
+          </p:cNvPr>
+          <p:cNvSpPr/>
+          <p:nvPr/>
+        </p:nvSpPr>
+        <p:spPr>
+          <a:xfrm>
+            <a:off x="1212381" y="2607199"/>
+            <a:ext cx="130631" cy="77694"/>
+          </a:xfrm>
+          <a:prstGeom prst="rect">
+            <a:avLst/>
+          </a:prstGeom>
+          <a:solidFill>
+            <a:srgbClr val="0070C0"/>
+          </a:solidFill>
+          <a:ln>
+            <a:noFill/>
+          </a:ln>
+        </p:spPr>
+        <p:style>
+          <a:lnRef idx="2">
+            <a:schemeClr val="accent1">
+              <a:shade val="50000"/>
+            </a:schemeClr>
+          </a:lnRef>
+          <a:fillRef idx="1">
+            <a:schemeClr val="accent1"/>
+          </a:fillRef>
+          <a:effectRef idx="0">
+            <a:schemeClr val="accent1"/>
+          </a:effectRef>
+          <a:fontRef idx="minor">
+            <a:schemeClr val="lt1"/>
+          </a:fontRef>
+        </p:style>
+        <p:txBody>
+          <a:bodyPr rtlCol="0" anchor="ctr"/>
+          <a:lstStyle/>
+          <a:p>
+            <a:pPr algn="ctr"/>
+            <a:endParaRPr lang="en-US"/>
+          </a:p>
+        </p:txBody>
+      </p:sp>
+      <p:sp>
+        <p:nvSpPr>
+          <p:cNvPr id="22" name="TextBox 21">
+            <a:extLst>
+              <a:ext uri="{FF2B5EF4-FFF2-40B4-BE49-F238E27FC236}">
+                <a16:creationId xmlns:a16="http://schemas.microsoft.com/office/drawing/2014/main" id="{5DDE345C-17BD-49B5-9EA9-31EC0D7C9A35}"/>
+              </a:ext>
+            </a:extLst>
+          </p:cNvPr>
+          <p:cNvSpPr txBox="1"/>
+          <p:nvPr/>
+        </p:nvSpPr>
+        <p:spPr>
+          <a:xfrm>
+            <a:off x="4703448" y="2532284"/>
+            <a:ext cx="607883" cy="276999"/>
+          </a:xfrm>
+          <a:prstGeom prst="rect">
+            <a:avLst/>
+          </a:prstGeom>
+          <a:solidFill>
+            <a:schemeClr val="tx1">
+              <a:lumMod val="85000"/>
+            </a:schemeClr>
+          </a:solidFill>
+        </p:spPr>
+        <p:txBody>
+          <a:bodyPr wrap="square" rtlCol="0">
+            <a:spAutoFit/>
+          </a:bodyPr>
+          <a:lstStyle/>
+          <a:p>
+            <a:r>
+              <a:rPr lang="en-US" sz="600" dirty="0">
+                <a:solidFill>
+                  <a:schemeClr val="bg1"/>
+                </a:solidFill>
+              </a:rPr>
+              <a:t>        mean</a:t>
+            </a:r>
+          </a:p>
+          <a:p>
+            <a:r>
+              <a:rPr lang="en-US" sz="600" dirty="0">
+                <a:solidFill>
+                  <a:schemeClr val="bg1"/>
+                </a:solidFill>
+              </a:rPr>
+              <a:t>        median</a:t>
+            </a:r>
+          </a:p>
+        </p:txBody>
+      </p:sp>
+      <p:sp>
+        <p:nvSpPr>
+          <p:cNvPr id="23" name="Rectangle 22">
+            <a:extLst>
+              <a:ext uri="{FF2B5EF4-FFF2-40B4-BE49-F238E27FC236}">
+                <a16:creationId xmlns:a16="http://schemas.microsoft.com/office/drawing/2014/main" id="{706F0519-C22A-4821-86DD-A55A6F867D87}"/>
+              </a:ext>
+            </a:extLst>
+          </p:cNvPr>
+          <p:cNvSpPr/>
+          <p:nvPr/>
+        </p:nvSpPr>
+        <p:spPr>
+          <a:xfrm>
+            <a:off x="4779321" y="2689491"/>
+            <a:ext cx="130631" cy="77694"/>
+          </a:xfrm>
+          <a:prstGeom prst="rect">
+            <a:avLst/>
+          </a:prstGeom>
+          <a:solidFill>
+            <a:srgbClr val="FC8004"/>
+          </a:solidFill>
+          <a:ln>
+            <a:noFill/>
+          </a:ln>
+        </p:spPr>
+        <p:style>
+          <a:lnRef idx="2">
+            <a:schemeClr val="accent1">
+              <a:shade val="50000"/>
+            </a:schemeClr>
+          </a:lnRef>
+          <a:fillRef idx="1">
+            <a:schemeClr val="accent1"/>
+          </a:fillRef>
+          <a:effectRef idx="0">
+            <a:schemeClr val="accent1"/>
+          </a:effectRef>
+          <a:fontRef idx="minor">
+            <a:schemeClr val="lt1"/>
+          </a:fontRef>
+        </p:style>
+        <p:txBody>
+          <a:bodyPr rtlCol="0" anchor="ctr"/>
+          <a:lstStyle/>
+          <a:p>
+            <a:pPr algn="ctr"/>
+            <a:endParaRPr lang="en-US"/>
+          </a:p>
+        </p:txBody>
+      </p:sp>
+      <p:sp>
+        <p:nvSpPr>
+          <p:cNvPr id="24" name="Rectangle 23">
+            <a:extLst>
+              <a:ext uri="{FF2B5EF4-FFF2-40B4-BE49-F238E27FC236}">
+                <a16:creationId xmlns:a16="http://schemas.microsoft.com/office/drawing/2014/main" id="{CE3C4B07-A1BB-4A5E-A90D-DFC09A22E35C}"/>
+              </a:ext>
+            </a:extLst>
+          </p:cNvPr>
+          <p:cNvSpPr/>
+          <p:nvPr/>
+        </p:nvSpPr>
+        <p:spPr>
+          <a:xfrm>
+            <a:off x="4779321" y="2599364"/>
+            <a:ext cx="130631" cy="77694"/>
+          </a:xfrm>
+          <a:prstGeom prst="rect">
+            <a:avLst/>
+          </a:prstGeom>
+          <a:solidFill>
+            <a:srgbClr val="0070C0"/>
+          </a:solidFill>
+          <a:ln>
+            <a:noFill/>
+          </a:ln>
+        </p:spPr>
+        <p:style>
+          <a:lnRef idx="2">
+            <a:schemeClr val="accent1">
+              <a:shade val="50000"/>
+            </a:schemeClr>
+          </a:lnRef>
+          <a:fillRef idx="1">
+            <a:schemeClr val="accent1"/>
+          </a:fillRef>
+          <a:effectRef idx="0">
+            <a:schemeClr val="accent1"/>
+          </a:effectRef>
+          <a:fontRef idx="minor">
+            <a:schemeClr val="lt1"/>
+          </a:fontRef>
+        </p:style>
+        <p:txBody>
+          <a:bodyPr rtlCol="0" anchor="ctr"/>
+          <a:lstStyle/>
+          <a:p>
+            <a:pPr algn="ctr"/>
+            <a:endParaRPr lang="en-US"/>
+          </a:p>
+        </p:txBody>
+      </p:sp>
+      <p:sp>
+        <p:nvSpPr>
+          <p:cNvPr id="28" name="TextBox 27">
+            <a:extLst>
+              <a:ext uri="{FF2B5EF4-FFF2-40B4-BE49-F238E27FC236}">
+                <a16:creationId xmlns:a16="http://schemas.microsoft.com/office/drawing/2014/main" id="{EA1FA03D-99EC-4408-9B1B-CF577A01491A}"/>
+              </a:ext>
+            </a:extLst>
+          </p:cNvPr>
+          <p:cNvSpPr txBox="1"/>
+          <p:nvPr/>
+        </p:nvSpPr>
+        <p:spPr>
+          <a:xfrm>
+            <a:off x="10675677" y="2484387"/>
+            <a:ext cx="607883" cy="276999"/>
+          </a:xfrm>
+          <a:prstGeom prst="rect">
+            <a:avLst/>
+          </a:prstGeom>
+          <a:solidFill>
+            <a:schemeClr val="tx1">
+              <a:lumMod val="85000"/>
+            </a:schemeClr>
+          </a:solidFill>
+        </p:spPr>
+        <p:txBody>
+          <a:bodyPr wrap="square" rtlCol="0">
+            <a:spAutoFit/>
+          </a:bodyPr>
+          <a:lstStyle/>
+          <a:p>
+            <a:r>
+              <a:rPr lang="en-US" sz="600" dirty="0">
+                <a:solidFill>
+                  <a:schemeClr val="bg1"/>
+                </a:solidFill>
+              </a:rPr>
+              <a:t>        mean</a:t>
+            </a:r>
+          </a:p>
+          <a:p>
+            <a:r>
+              <a:rPr lang="en-US" sz="600" dirty="0">
+                <a:solidFill>
+                  <a:schemeClr val="bg1"/>
+                </a:solidFill>
+              </a:rPr>
+              <a:t>        median</a:t>
+            </a:r>
+          </a:p>
+        </p:txBody>
+      </p:sp>
+      <p:sp>
+        <p:nvSpPr>
+          <p:cNvPr id="29" name="Rectangle 28">
+            <a:extLst>
+              <a:ext uri="{FF2B5EF4-FFF2-40B4-BE49-F238E27FC236}">
+                <a16:creationId xmlns:a16="http://schemas.microsoft.com/office/drawing/2014/main" id="{7F16BBE9-4D81-411B-A462-49510701D7CB}"/>
+              </a:ext>
+            </a:extLst>
+          </p:cNvPr>
+          <p:cNvSpPr/>
+          <p:nvPr/>
+        </p:nvSpPr>
+        <p:spPr>
+          <a:xfrm>
+            <a:off x="10749922" y="2636409"/>
+            <a:ext cx="130631" cy="77694"/>
+          </a:xfrm>
+          <a:prstGeom prst="rect">
+            <a:avLst/>
+          </a:prstGeom>
+          <a:solidFill>
+            <a:srgbClr val="FC8004"/>
+          </a:solidFill>
+          <a:ln>
+            <a:noFill/>
+          </a:ln>
+        </p:spPr>
+        <p:style>
+          <a:lnRef idx="2">
+            <a:schemeClr val="accent1">
+              <a:shade val="50000"/>
+            </a:schemeClr>
+          </a:lnRef>
+          <a:fillRef idx="1">
+            <a:schemeClr val="accent1"/>
+          </a:fillRef>
+          <a:effectRef idx="0">
+            <a:schemeClr val="accent1"/>
+          </a:effectRef>
+          <a:fontRef idx="minor">
+            <a:schemeClr val="lt1"/>
+          </a:fontRef>
+        </p:style>
+        <p:txBody>
+          <a:bodyPr rtlCol="0" anchor="ctr"/>
+          <a:lstStyle/>
+          <a:p>
+            <a:pPr algn="ctr"/>
+            <a:endParaRPr lang="en-US"/>
+          </a:p>
+        </p:txBody>
+      </p:sp>
+      <p:sp>
+        <p:nvSpPr>
+          <p:cNvPr id="30" name="Rectangle 29">
+            <a:extLst>
+              <a:ext uri="{FF2B5EF4-FFF2-40B4-BE49-F238E27FC236}">
+                <a16:creationId xmlns:a16="http://schemas.microsoft.com/office/drawing/2014/main" id="{486A728B-D6ED-44D3-A55B-9503295BE011}"/>
+              </a:ext>
+            </a:extLst>
+          </p:cNvPr>
+          <p:cNvSpPr/>
+          <p:nvPr/>
+        </p:nvSpPr>
+        <p:spPr>
+          <a:xfrm>
+            <a:off x="10749922" y="2551839"/>
+            <a:ext cx="130631" cy="77694"/>
+          </a:xfrm>
+          <a:prstGeom prst="rect">
+            <a:avLst/>
+          </a:prstGeom>
+          <a:solidFill>
+            <a:srgbClr val="0070C0"/>
+          </a:solidFill>
+          <a:ln>
+            <a:noFill/>
+          </a:ln>
+        </p:spPr>
+        <p:style>
+          <a:lnRef idx="2">
+            <a:schemeClr val="accent1">
+              <a:shade val="50000"/>
+            </a:schemeClr>
+          </a:lnRef>
+          <a:fillRef idx="1">
+            <a:schemeClr val="accent1"/>
+          </a:fillRef>
+          <a:effectRef idx="0">
+            <a:schemeClr val="accent1"/>
+          </a:effectRef>
+          <a:fontRef idx="minor">
+            <a:schemeClr val="lt1"/>
+          </a:fontRef>
+        </p:style>
+        <p:txBody>
+          <a:bodyPr rtlCol="0" anchor="ctr"/>
+          <a:lstStyle/>
+          <a:p>
+            <a:pPr algn="ctr"/>
+            <a:endParaRPr lang="en-US"/>
+          </a:p>
+        </p:txBody>
+      </p:sp>
     </p:spTree>
     <p:extLst>
       <p:ext uri="{BB962C8B-B14F-4D97-AF65-F5344CB8AC3E}">

</xml_diff>